<commit_message>
Adds slide for running time.
</commit_message>
<xml_diff>
--- a/presentation/LiaBogoev_JohnCall.pptx
+++ b/presentation/LiaBogoev_JohnCall.pptx
@@ -5497,7 +5497,7 @@
       </p:sp>
       <p:sp>
         <p:nvSpPr>
-          <p:cNvPr id="3" name="Content Placeholder 2"/>
+          <p:cNvPr id="4" name="Content Placeholder 2"/>
           <p:cNvSpPr>
             <a:spLocks noGrp="1"/>
           </p:cNvSpPr>
@@ -5505,12 +5505,99 @@
             <p:ph idx="1"/>
           </p:nvPr>
         </p:nvSpPr>
-        <p:spPr/>
-        <p:txBody>
-          <a:bodyPr/>
-          <a:lstStyle/>
-          <a:p>
-            <a:endParaRPr lang="en-US" dirty="0"/>
+        <p:spPr>
+          <a:xfrm>
+            <a:off x="822960" y="1100628"/>
+            <a:ext cx="7520940" cy="3579849"/>
+          </a:xfrm>
+        </p:spPr>
+        <p:txBody>
+          <a:bodyPr>
+            <a:normAutofit lnSpcReduction="10000"/>
+          </a:bodyPr>
+          <a:lstStyle/>
+          <a:p>
+            <a:pPr lvl="1">
+              <a:buFont typeface="Arial"/>
+              <a:buChar char="•"/>
+            </a:pPr>
+            <a:r>
+              <a:rPr lang="en-US" sz="2200" dirty="0" smtClean="0"/>
+              <a:t>Indexing documents</a:t>
+            </a:r>
+          </a:p>
+          <a:p>
+            <a:pPr lvl="2">
+              <a:buFont typeface="Arial"/>
+              <a:buChar char="•"/>
+            </a:pPr>
+            <a:r>
+              <a:rPr lang="en-US" sz="2200" dirty="0" smtClean="0"/>
+              <a:t>Adds the words in each document (minus stop words) to a dictionary</a:t>
+            </a:r>
+          </a:p>
+          <a:p>
+            <a:pPr lvl="2">
+              <a:buFont typeface="Arial"/>
+              <a:buChar char="•"/>
+            </a:pPr>
+            <a:r>
+              <a:rPr lang="en-US" sz="2200" dirty="0" smtClean="0"/>
+              <a:t>Adds the documents to a global dictionary based on the words they contain</a:t>
+            </a:r>
+          </a:p>
+          <a:p>
+            <a:pPr lvl="2">
+              <a:buFont typeface="Arial"/>
+              <a:buChar char="•"/>
+            </a:pPr>
+            <a:r>
+              <a:rPr lang="en-US" sz="2200" dirty="0" smtClean="0"/>
+              <a:t>O(n) </a:t>
+            </a:r>
+            <a:r>
+              <a:rPr lang="en-US" sz="2200" dirty="0" smtClean="0">
+                <a:sym typeface="Wingdings"/>
+              </a:rPr>
+              <a:t> dependent on the number of words in the docs and the number of docs</a:t>
+            </a:r>
+          </a:p>
+          <a:p>
+            <a:pPr lvl="1">
+              <a:buFont typeface="Arial"/>
+              <a:buChar char="•"/>
+            </a:pPr>
+            <a:r>
+              <a:rPr lang="en-US" sz="2200" dirty="0" smtClean="0">
+                <a:sym typeface="Wingdings"/>
+              </a:rPr>
+              <a:t>Parsing queries</a:t>
+            </a:r>
+          </a:p>
+          <a:p>
+            <a:pPr lvl="2">
+              <a:buFont typeface="Arial"/>
+              <a:buChar char="•"/>
+            </a:pPr>
+            <a:r>
+              <a:rPr lang="en-US" sz="2200" dirty="0" smtClean="0">
+                <a:sym typeface="Wingdings"/>
+              </a:rPr>
+              <a:t>Recursive</a:t>
+            </a:r>
+          </a:p>
+          <a:p>
+            <a:pPr lvl="2">
+              <a:buFont typeface="Arial"/>
+              <a:buChar char="•"/>
+            </a:pPr>
+            <a:r>
+              <a:rPr lang="en-US" sz="2200" dirty="0" smtClean="0">
+                <a:sym typeface="Wingdings"/>
+              </a:rPr>
+              <a:t>O(2^n)  dependent on the number of words in the query</a:t>
+            </a:r>
+            <a:endParaRPr lang="en-US" sz="2200" dirty="0" smtClean="0"/>
           </a:p>
         </p:txBody>
       </p:sp>

</xml_diff>

<commit_message>
Powerpoint revisions + minor report revisions
</commit_message>
<xml_diff>
--- a/presentation/LiaBogoev_JohnCall.pptx
+++ b/presentation/LiaBogoev_JohnCall.pptx
@@ -9,7 +9,6 @@
     <p:sldId id="257" r:id="rId3"/>
     <p:sldId id="258" r:id="rId4"/>
     <p:sldId id="259" r:id="rId5"/>
-    <p:sldId id="260" r:id="rId6"/>
   </p:sldIdLst>
   <p:sldSz cx="9144000" cy="6858000" type="screen4x3"/>
   <p:notesSz cx="6858000" cy="9144000"/>
@@ -170,7 +169,7 @@
           <a:lstStyle/>
           <a:p>
             <a:pPr algn="ctr"/>
-            <a:endParaRPr lang="en-US"/>
+            <a:endParaRPr lang="en-US" dirty="0"/>
           </a:p>
         </p:txBody>
       </p:sp>
@@ -379,7 +378,7 @@
           <a:lstStyle/>
           <a:p>
             <a:pPr algn="ctr"/>
-            <a:endParaRPr lang="en-US"/>
+            <a:endParaRPr lang="en-US" dirty="0"/>
           </a:p>
         </p:txBody>
       </p:sp>
@@ -582,7 +581,7 @@
               <a:pPr/>
               <a:t>April 21, 2014</a:t>
             </a:fld>
-            <a:endParaRPr lang="en-US"/>
+            <a:endParaRPr lang="en-US" dirty="0"/>
           </a:p>
         </p:txBody>
       </p:sp>
@@ -601,7 +600,7 @@
           <a:bodyPr/>
           <a:lstStyle/>
           <a:p>
-            <a:endParaRPr lang="en-US"/>
+            <a:endParaRPr lang="en-US" dirty="0"/>
           </a:p>
         </p:txBody>
       </p:sp>
@@ -625,7 +624,7 @@
               <a:pPr/>
               <a:t>‹#›</a:t>
             </a:fld>
-            <a:endParaRPr lang="en-US"/>
+            <a:endParaRPr lang="en-US" dirty="0"/>
           </a:p>
         </p:txBody>
       </p:sp>
@@ -749,7 +748,7 @@
               <a:pPr/>
               <a:t>April 21, 2014</a:t>
             </a:fld>
-            <a:endParaRPr lang="en-US"/>
+            <a:endParaRPr lang="en-US" dirty="0"/>
           </a:p>
         </p:txBody>
       </p:sp>
@@ -768,7 +767,7 @@
           <a:bodyPr/>
           <a:lstStyle/>
           <a:p>
-            <a:endParaRPr lang="en-US"/>
+            <a:endParaRPr lang="en-US" dirty="0"/>
           </a:p>
         </p:txBody>
       </p:sp>
@@ -792,7 +791,7 @@
               <a:pPr/>
               <a:t>‹#›</a:t>
             </a:fld>
-            <a:endParaRPr lang="en-US"/>
+            <a:endParaRPr lang="en-US" dirty="0"/>
           </a:p>
         </p:txBody>
       </p:sp>
@@ -926,7 +925,7 @@
               <a:pPr/>
               <a:t>April 21, 2014</a:t>
             </a:fld>
-            <a:endParaRPr lang="en-US"/>
+            <a:endParaRPr lang="en-US" dirty="0"/>
           </a:p>
         </p:txBody>
       </p:sp>
@@ -945,7 +944,7 @@
           <a:bodyPr/>
           <a:lstStyle/>
           <a:p>
-            <a:endParaRPr lang="en-US"/>
+            <a:endParaRPr lang="en-US" dirty="0"/>
           </a:p>
         </p:txBody>
       </p:sp>
@@ -969,7 +968,7 @@
               <a:pPr/>
               <a:t>‹#›</a:t>
             </a:fld>
-            <a:endParaRPr lang="en-US"/>
+            <a:endParaRPr lang="en-US" dirty="0"/>
           </a:p>
         </p:txBody>
       </p:sp>
@@ -1093,7 +1092,7 @@
               <a:pPr/>
               <a:t>April 21, 2014</a:t>
             </a:fld>
-            <a:endParaRPr lang="en-US"/>
+            <a:endParaRPr lang="en-US" dirty="0"/>
           </a:p>
         </p:txBody>
       </p:sp>
@@ -1112,7 +1111,7 @@
           <a:bodyPr/>
           <a:lstStyle/>
           <a:p>
-            <a:endParaRPr lang="en-US"/>
+            <a:endParaRPr lang="en-US" dirty="0"/>
           </a:p>
         </p:txBody>
       </p:sp>
@@ -1136,7 +1135,7 @@
               <a:pPr/>
               <a:t>‹#›</a:t>
             </a:fld>
-            <a:endParaRPr lang="en-US"/>
+            <a:endParaRPr lang="en-US" dirty="0"/>
           </a:p>
         </p:txBody>
       </p:sp>
@@ -1368,7 +1367,7 @@
           <a:lstStyle/>
           <a:p>
             <a:pPr algn="ctr"/>
-            <a:endParaRPr lang="en-US"/>
+            <a:endParaRPr lang="en-US" dirty="0"/>
           </a:p>
         </p:txBody>
       </p:sp>
@@ -1416,7 +1415,7 @@
           <a:lstStyle/>
           <a:p>
             <a:pPr algn="ctr"/>
-            <a:endParaRPr lang="en-US"/>
+            <a:endParaRPr lang="en-US" dirty="0"/>
           </a:p>
         </p:txBody>
       </p:sp>
@@ -1648,7 +1647,7 @@
               <a:pPr/>
               <a:t>April 21, 2014</a:t>
             </a:fld>
-            <a:endParaRPr lang="en-US"/>
+            <a:endParaRPr lang="en-US" dirty="0"/>
           </a:p>
         </p:txBody>
       </p:sp>
@@ -1667,7 +1666,7 @@
           <a:bodyPr/>
           <a:lstStyle/>
           <a:p>
-            <a:endParaRPr lang="en-US"/>
+            <a:endParaRPr lang="en-US" dirty="0"/>
           </a:p>
         </p:txBody>
       </p:sp>
@@ -1691,7 +1690,7 @@
               <a:pPr/>
               <a:t>‹#›</a:t>
             </a:fld>
-            <a:endParaRPr lang="en-US"/>
+            <a:endParaRPr lang="en-US" dirty="0"/>
           </a:p>
         </p:txBody>
       </p:sp>
@@ -1910,7 +1909,7 @@
               <a:pPr/>
               <a:t>April 21, 2014</a:t>
             </a:fld>
-            <a:endParaRPr lang="en-US"/>
+            <a:endParaRPr lang="en-US" dirty="0"/>
           </a:p>
         </p:txBody>
       </p:sp>
@@ -1929,7 +1928,7 @@
           <a:bodyPr/>
           <a:lstStyle/>
           <a:p>
-            <a:endParaRPr lang="en-US"/>
+            <a:endParaRPr lang="en-US" dirty="0"/>
           </a:p>
         </p:txBody>
       </p:sp>
@@ -1953,7 +1952,7 @@
               <a:pPr/>
               <a:t>‹#›</a:t>
             </a:fld>
-            <a:endParaRPr lang="en-US"/>
+            <a:endParaRPr lang="en-US" dirty="0"/>
           </a:p>
         </p:txBody>
       </p:sp>
@@ -2400,7 +2399,7 @@
               <a:pPr/>
               <a:t>April 21, 2014</a:t>
             </a:fld>
-            <a:endParaRPr lang="en-US"/>
+            <a:endParaRPr lang="en-US" dirty="0"/>
           </a:p>
         </p:txBody>
       </p:sp>
@@ -2419,7 +2418,7 @@
           <a:bodyPr/>
           <a:lstStyle/>
           <a:p>
-            <a:endParaRPr lang="en-US"/>
+            <a:endParaRPr lang="en-US" dirty="0"/>
           </a:p>
         </p:txBody>
       </p:sp>
@@ -2443,7 +2442,7 @@
               <a:pPr/>
               <a:t>‹#›</a:t>
             </a:fld>
-            <a:endParaRPr lang="en-US"/>
+            <a:endParaRPr lang="en-US" dirty="0"/>
           </a:p>
         </p:txBody>
       </p:sp>
@@ -2515,7 +2514,7 @@
               <a:pPr/>
               <a:t>April 21, 2014</a:t>
             </a:fld>
-            <a:endParaRPr lang="en-US"/>
+            <a:endParaRPr lang="en-US" dirty="0"/>
           </a:p>
         </p:txBody>
       </p:sp>
@@ -2534,7 +2533,7 @@
           <a:bodyPr/>
           <a:lstStyle/>
           <a:p>
-            <a:endParaRPr lang="en-US"/>
+            <a:endParaRPr lang="en-US" dirty="0"/>
           </a:p>
         </p:txBody>
       </p:sp>
@@ -2558,7 +2557,7 @@
               <a:pPr/>
               <a:t>‹#›</a:t>
             </a:fld>
-            <a:endParaRPr lang="en-US"/>
+            <a:endParaRPr lang="en-US" dirty="0"/>
           </a:p>
         </p:txBody>
       </p:sp>
@@ -2607,7 +2606,7 @@
               <a:pPr/>
               <a:t>April 21, 2014</a:t>
             </a:fld>
-            <a:endParaRPr lang="en-US"/>
+            <a:endParaRPr lang="en-US" dirty="0"/>
           </a:p>
         </p:txBody>
       </p:sp>
@@ -2626,7 +2625,7 @@
           <a:bodyPr/>
           <a:lstStyle/>
           <a:p>
-            <a:endParaRPr lang="en-US"/>
+            <a:endParaRPr lang="en-US" dirty="0"/>
           </a:p>
         </p:txBody>
       </p:sp>
@@ -2650,7 +2649,7 @@
               <a:pPr/>
               <a:t>‹#›</a:t>
             </a:fld>
-            <a:endParaRPr lang="en-US"/>
+            <a:endParaRPr lang="en-US" dirty="0"/>
           </a:p>
         </p:txBody>
       </p:sp>
@@ -2721,7 +2720,7 @@
           <a:lstStyle/>
           <a:p>
             <a:pPr algn="ctr"/>
-            <a:endParaRPr lang="en-US"/>
+            <a:endParaRPr lang="en-US" dirty="0"/>
           </a:p>
         </p:txBody>
       </p:sp>
@@ -2769,7 +2768,7 @@
           <a:lstStyle/>
           <a:p>
             <a:pPr marL="0" algn="ctr" defTabSz="914400" rtl="0" eaLnBrk="1" latinLnBrk="0" hangingPunct="1"/>
-            <a:endParaRPr lang="en-US" sz="1800" kern="1200">
+            <a:endParaRPr lang="en-US" sz="1800" kern="1200" dirty="0">
               <a:solidFill>
                 <a:schemeClr val="lt1"/>
               </a:solidFill>
@@ -3039,7 +3038,7 @@
               <a:pPr/>
               <a:t>April 21, 2014</a:t>
             </a:fld>
-            <a:endParaRPr lang="en-US"/>
+            <a:endParaRPr lang="en-US" dirty="0"/>
           </a:p>
         </p:txBody>
       </p:sp>
@@ -3336,7 +3335,7 @@
           <a:lstStyle/>
           <a:p>
             <a:pPr algn="ctr"/>
-            <a:endParaRPr lang="en-US"/>
+            <a:endParaRPr lang="en-US" dirty="0"/>
           </a:p>
         </p:txBody>
       </p:sp>
@@ -3443,7 +3442,7 @@
           <a:lstStyle/>
           <a:p>
             <a:pPr algn="ctr"/>
-            <a:endParaRPr lang="en-US"/>
+            <a:endParaRPr lang="en-US" dirty="0"/>
           </a:p>
         </p:txBody>
       </p:sp>
@@ -3570,7 +3569,7 @@
               <a:pPr/>
               <a:t>April 21, 2014</a:t>
             </a:fld>
-            <a:endParaRPr lang="en-US"/>
+            <a:endParaRPr lang="en-US" dirty="0"/>
           </a:p>
         </p:txBody>
       </p:sp>
@@ -3589,7 +3588,7 @@
           <a:bodyPr/>
           <a:lstStyle/>
           <a:p>
-            <a:endParaRPr lang="en-US"/>
+            <a:endParaRPr lang="en-US" dirty="0"/>
           </a:p>
         </p:txBody>
       </p:sp>
@@ -3613,7 +3612,7 @@
               <a:pPr/>
               <a:t>‹#›</a:t>
             </a:fld>
-            <a:endParaRPr lang="en-US"/>
+            <a:endParaRPr lang="en-US" dirty="0"/>
           </a:p>
         </p:txBody>
       </p:sp>
@@ -3958,7 +3957,7 @@
           <a:lstStyle/>
           <a:p>
             <a:pPr algn="ctr"/>
-            <a:endParaRPr lang="en-US"/>
+            <a:endParaRPr lang="en-US" dirty="0"/>
           </a:p>
         </p:txBody>
       </p:sp>
@@ -4277,7 +4276,7 @@
           <a:lstStyle/>
           <a:p>
             <a:pPr algn="ctr"/>
-            <a:endParaRPr lang="en-US"/>
+            <a:endParaRPr lang="en-US" dirty="0"/>
           </a:p>
         </p:txBody>
       </p:sp>
@@ -5013,8 +5012,29 @@
             </a:pPr>
             <a:r>
               <a:rPr lang="en-US" sz="2200" dirty="0" smtClean="0"/>
-              <a:t>Implemented using PHP, JavaScript, HTML,  CSS</a:t>
-            </a:r>
+              <a:t>Implemented </a:t>
+            </a:r>
+            <a:r>
+              <a:rPr lang="en-US" sz="2200" dirty="0" smtClean="0"/>
+              <a:t>using </a:t>
+            </a:r>
+            <a:r>
+              <a:rPr lang="en-US" sz="2200" dirty="0" smtClean="0"/>
+              <a:t>JavaScript, HTML, </a:t>
+            </a:r>
+            <a:r>
+              <a:rPr lang="en-US" sz="2200" dirty="0" smtClean="0"/>
+              <a:t>CSS, </a:t>
+            </a:r>
+            <a:r>
+              <a:rPr lang="en-US" sz="2200" dirty="0" smtClean="0"/>
+              <a:t>and negligibly </a:t>
+            </a:r>
+            <a:r>
+              <a:rPr lang="en-US" sz="2200" dirty="0" smtClean="0"/>
+              <a:t>PHP</a:t>
+            </a:r>
+            <a:endParaRPr lang="en-US" sz="2200" dirty="0" smtClean="0"/>
           </a:p>
         </p:txBody>
       </p:sp>
@@ -5071,234 +5091,1237 @@
           </a:p>
         </p:txBody>
       </p:sp>
-      <p:sp>
-        <p:nvSpPr>
-          <p:cNvPr id="4" name="Content Placeholder 2"/>
-          <p:cNvSpPr txBox="1">
-            <a:spLocks/>
-          </p:cNvSpPr>
+      <mc:AlternateContent xmlns:mc="http://schemas.openxmlformats.org/markup-compatibility/2006">
+        <mc:Choice xmlns:a14="http://schemas.microsoft.com/office/drawing/2010/main" Requires="a14">
+          <p:sp>
+            <p:nvSpPr>
+              <p:cNvPr id="4" name="Content Placeholder 2"/>
+              <p:cNvSpPr txBox="1">
+                <a:spLocks/>
+              </p:cNvSpPr>
+              <p:nvPr/>
+            </p:nvSpPr>
+            <p:spPr>
+              <a:xfrm>
+                <a:off x="822960" y="1081400"/>
+                <a:ext cx="7520940" cy="3579849"/>
+              </a:xfrm>
+              <a:prstGeom prst="rect">
+                <a:avLst/>
+              </a:prstGeom>
+            </p:spPr>
+            <p:txBody>
+              <a:bodyPr vert="horz" lIns="91440" tIns="45720" rIns="91440" bIns="45720" rtlCol="0">
+                <a:normAutofit/>
+              </a:bodyPr>
+              <a:lstStyle>
+                <a:lvl1pPr marL="342900" indent="-342900" algn="l" defTabSz="914400" rtl="0" eaLnBrk="1" latinLnBrk="0" hangingPunct="1">
+                  <a:spcBef>
+                    <a:spcPts val="800"/>
+                  </a:spcBef>
+                  <a:buFont typeface="Arial" pitchFamily="34" charset="0"/>
+                  <a:buNone/>
+                  <a:defRPr sz="1600" b="1" kern="1200">
+                    <a:solidFill>
+                      <a:schemeClr val="tx1"/>
+                    </a:solidFill>
+                    <a:latin typeface="+mn-lt"/>
+                    <a:ea typeface="+mn-ea"/>
+                    <a:cs typeface="+mn-cs"/>
+                  </a:defRPr>
+                </a:lvl1pPr>
+                <a:lvl2pPr marL="173736" indent="-173736" algn="l" defTabSz="914400" rtl="0" eaLnBrk="1" latinLnBrk="0" hangingPunct="1">
+                  <a:spcBef>
+                    <a:spcPts val="300"/>
+                  </a:spcBef>
+                  <a:buClr>
+                    <a:schemeClr val="accent2"/>
+                  </a:buClr>
+                  <a:buFont typeface="Wingdings" pitchFamily="2" charset="2"/>
+                  <a:buChar char="§"/>
+                  <a:defRPr sz="1600" kern="1200">
+                    <a:solidFill>
+                      <a:schemeClr val="tx1"/>
+                    </a:solidFill>
+                    <a:latin typeface="+mn-lt"/>
+                    <a:ea typeface="+mn-ea"/>
+                    <a:cs typeface="+mn-cs"/>
+                  </a:defRPr>
+                </a:lvl2pPr>
+                <a:lvl3pPr marL="402336" indent="-164592" algn="l" defTabSz="914400" rtl="0" eaLnBrk="1" latinLnBrk="0" hangingPunct="1">
+                  <a:spcBef>
+                    <a:spcPts val="300"/>
+                  </a:spcBef>
+                  <a:buClr>
+                    <a:schemeClr val="accent2"/>
+                  </a:buClr>
+                  <a:buFont typeface="Wingdings" pitchFamily="2" charset="2"/>
+                  <a:buChar char="§"/>
+                  <a:defRPr sz="1600" kern="1200">
+                    <a:solidFill>
+                      <a:schemeClr val="tx1"/>
+                    </a:solidFill>
+                    <a:latin typeface="+mn-lt"/>
+                    <a:ea typeface="+mn-ea"/>
+                    <a:cs typeface="+mn-cs"/>
+                  </a:defRPr>
+                </a:lvl3pPr>
+                <a:lvl4pPr marL="630936" indent="-164592" algn="l" defTabSz="914400" rtl="0" eaLnBrk="1" latinLnBrk="0" hangingPunct="1">
+                  <a:spcBef>
+                    <a:spcPts val="300"/>
+                  </a:spcBef>
+                  <a:buClr>
+                    <a:schemeClr val="accent2"/>
+                  </a:buClr>
+                  <a:buFont typeface="Wingdings" pitchFamily="2" charset="2"/>
+                  <a:buChar char="§"/>
+                  <a:defRPr sz="1600" kern="1200">
+                    <a:solidFill>
+                      <a:schemeClr val="tx1"/>
+                    </a:solidFill>
+                    <a:latin typeface="+mn-lt"/>
+                    <a:ea typeface="+mn-ea"/>
+                    <a:cs typeface="+mn-cs"/>
+                  </a:defRPr>
+                </a:lvl4pPr>
+                <a:lvl5pPr marL="859536" indent="-173736" algn="l" defTabSz="914400" rtl="0" eaLnBrk="1" latinLnBrk="0" hangingPunct="1">
+                  <a:spcBef>
+                    <a:spcPts val="300"/>
+                  </a:spcBef>
+                  <a:buClr>
+                    <a:schemeClr val="accent2"/>
+                  </a:buClr>
+                  <a:buFont typeface="Wingdings" pitchFamily="2" charset="2"/>
+                  <a:buChar char="§"/>
+                  <a:defRPr sz="1600" kern="1200">
+                    <a:solidFill>
+                      <a:schemeClr val="tx1"/>
+                    </a:solidFill>
+                    <a:latin typeface="+mn-lt"/>
+                    <a:ea typeface="+mn-ea"/>
+                    <a:cs typeface="+mn-cs"/>
+                  </a:defRPr>
+                </a:lvl5pPr>
+                <a:lvl6pPr marL="1097280" indent="-173736" algn="l" defTabSz="914400" rtl="0" eaLnBrk="1" latinLnBrk="0" hangingPunct="1">
+                  <a:spcBef>
+                    <a:spcPts val="300"/>
+                  </a:spcBef>
+                  <a:buClr>
+                    <a:schemeClr val="accent2"/>
+                  </a:buClr>
+                  <a:buFont typeface="Wingdings" pitchFamily="2" charset="2"/>
+                  <a:buChar char="§"/>
+                  <a:defRPr sz="1400" kern="1200">
+                    <a:solidFill>
+                      <a:schemeClr val="tx1"/>
+                    </a:solidFill>
+                    <a:latin typeface="+mn-lt"/>
+                    <a:ea typeface="+mn-ea"/>
+                    <a:cs typeface="+mn-cs"/>
+                  </a:defRPr>
+                </a:lvl6pPr>
+                <a:lvl7pPr marL="1353312" indent="-164592" algn="l" defTabSz="914400" rtl="0" eaLnBrk="1" latinLnBrk="0" hangingPunct="1">
+                  <a:spcBef>
+                    <a:spcPts val="300"/>
+                  </a:spcBef>
+                  <a:buClr>
+                    <a:schemeClr val="accent2"/>
+                  </a:buClr>
+                  <a:buFont typeface="Wingdings" pitchFamily="2" charset="2"/>
+                  <a:buChar char="§"/>
+                  <a:defRPr sz="1400" kern="1200">
+                    <a:solidFill>
+                      <a:schemeClr val="tx1"/>
+                    </a:solidFill>
+                    <a:latin typeface="+mn-lt"/>
+                    <a:ea typeface="+mn-ea"/>
+                    <a:cs typeface="+mn-cs"/>
+                  </a:defRPr>
+                </a:lvl7pPr>
+                <a:lvl8pPr marL="1581912" indent="-164592" algn="l" defTabSz="914400" rtl="0" eaLnBrk="1" latinLnBrk="0" hangingPunct="1">
+                  <a:spcBef>
+                    <a:spcPts val="300"/>
+                  </a:spcBef>
+                  <a:buClr>
+                    <a:schemeClr val="accent2"/>
+                  </a:buClr>
+                  <a:buFont typeface="Wingdings" pitchFamily="2" charset="2"/>
+                  <a:buChar char="§"/>
+                  <a:defRPr sz="1400" kern="1200">
+                    <a:solidFill>
+                      <a:schemeClr val="tx1"/>
+                    </a:solidFill>
+                    <a:latin typeface="+mn-lt"/>
+                    <a:ea typeface="+mn-ea"/>
+                    <a:cs typeface="+mn-cs"/>
+                  </a:defRPr>
+                </a:lvl8pPr>
+                <a:lvl9pPr marL="1792224" indent="-164592" algn="l" defTabSz="914400" rtl="0" eaLnBrk="1" latinLnBrk="0" hangingPunct="1">
+                  <a:spcBef>
+                    <a:spcPts val="300"/>
+                  </a:spcBef>
+                  <a:buClr>
+                    <a:schemeClr val="accent2"/>
+                  </a:buClr>
+                  <a:buFont typeface="Wingdings" pitchFamily="2" charset="2"/>
+                  <a:buChar char="§"/>
+                  <a:defRPr sz="1400" kern="1200">
+                    <a:solidFill>
+                      <a:schemeClr val="tx1"/>
+                    </a:solidFill>
+                    <a:latin typeface="+mn-lt"/>
+                    <a:ea typeface="+mn-ea"/>
+                    <a:cs typeface="+mn-cs"/>
+                  </a:defRPr>
+                </a:lvl9pPr>
+              </a:lstStyle>
+              <a:p>
+                <a:pPr lvl="1">
+                  <a:buFont typeface="Arial"/>
+                  <a:buChar char="•"/>
+                </a:pPr>
+                <a:r>
+                  <a:rPr lang="en-US" sz="2200" dirty="0" smtClean="0"/>
+                  <a:t>Variable-</a:t>
+                </a:r>
+                <a:r>
+                  <a:rPr lang="en-US" sz="2200" dirty="0" smtClean="0"/>
+                  <a:t>length </a:t>
+                </a:r>
+                <a:r>
+                  <a:rPr lang="en-US" sz="2200" dirty="0" smtClean="0"/>
+                  <a:t>Arrays</a:t>
+                </a:r>
+              </a:p>
+              <a:p>
+                <a:pPr lvl="2">
+                  <a:buFont typeface="Arial"/>
+                  <a:buChar char="•"/>
+                </a:pPr>
+                <a:r>
+                  <a:rPr lang="en-US" sz="2200" dirty="0" smtClean="0"/>
+                  <a:t>Simple list of DOC</a:t>
+                </a:r>
+              </a:p>
+              <a:p>
+                <a:pPr lvl="2">
+                  <a:buFont typeface="Arial"/>
+                  <a:buChar char="•"/>
+                </a:pPr>
+                <a:r>
+                  <a:rPr lang="en-US" sz="2200" dirty="0"/>
+                  <a:t>Python’s list </a:t>
+                </a:r>
+                <a:r>
+                  <a:rPr lang="en-US" sz="2200" smtClean="0"/>
+                  <a:t>≡ array</a:t>
+                </a:r>
+                <a:endParaRPr lang="en-US" sz="2200" dirty="0" smtClean="0"/>
+              </a:p>
+              <a:p>
+                <a:pPr lvl="1">
+                  <a:buFont typeface="Arial"/>
+                  <a:buChar char="•"/>
+                </a:pPr>
+                <a:r>
+                  <a:rPr lang="en-US" sz="2200" dirty="0" smtClean="0"/>
+                  <a:t>Dictionary</a:t>
+                </a:r>
+              </a:p>
+              <a:p>
+                <a:pPr lvl="2">
+                  <a:buFont typeface="Arial"/>
+                  <a:buChar char="•"/>
+                </a:pPr>
+                <a:r>
+                  <a:rPr lang="en-US" sz="2200" dirty="0" smtClean="0"/>
+                  <a:t>Best suited for our needs</a:t>
+                </a:r>
+              </a:p>
+              <a:p>
+                <a:pPr lvl="2">
+                  <a:buFont typeface="Arial"/>
+                  <a:buChar char="•"/>
+                </a:pPr>
+                <a:r>
+                  <a:rPr lang="en-US" sz="2200" dirty="0" smtClean="0"/>
+                  <a:t>Great time complexity</a:t>
+                </a:r>
+              </a:p>
+              <a:p>
+                <a:pPr lvl="3">
+                  <a:buFont typeface="Arial"/>
+                  <a:buChar char="•"/>
+                </a:pPr>
+                <a14:m>
+                  <m:oMath xmlns:m="http://schemas.openxmlformats.org/officeDocument/2006/math">
+                    <m:r>
+                      <a:rPr lang="en-US" sz="2200" b="0" i="1" smtClean="0">
+                        <a:latin typeface="Cambria Math"/>
+                      </a:rPr>
+                      <m:t>𝑂</m:t>
+                    </m:r>
+                    <m:r>
+                      <a:rPr lang="en-US" sz="2200" b="0" i="1" smtClean="0">
+                        <a:latin typeface="Cambria Math"/>
+                      </a:rPr>
+                      <m:t>(1)</m:t>
+                    </m:r>
+                  </m:oMath>
+                </a14:m>
+                <a:r>
+                  <a:rPr lang="en-US" sz="2200" dirty="0" smtClean="0"/>
+                  <a:t> </a:t>
+                </a:r>
+                <a:r>
+                  <a:rPr lang="en-US" sz="2200" dirty="0" smtClean="0"/>
+                  <a:t>to </a:t>
+                </a:r>
+                <a:r>
+                  <a:rPr lang="en-US" sz="2200" dirty="0" smtClean="0"/>
+                  <a:t>retrieve</a:t>
+                </a:r>
+                <a:endParaRPr lang="en-US" sz="2200" dirty="0" smtClean="0"/>
+              </a:p>
+            </p:txBody>
+          </p:sp>
+        </mc:Choice>
+        <mc:Fallback>
+          <p:sp>
+            <p:nvSpPr>
+              <p:cNvPr id="4" name="Content Placeholder 2"/>
+              <p:cNvSpPr txBox="1">
+                <a:spLocks noRot="1" noChangeAspect="1" noMove="1" noResize="1" noEditPoints="1" noAdjustHandles="1" noChangeArrowheads="1" noChangeShapeType="1" noTextEdit="1"/>
+              </p:cNvSpPr>
+              <p:nvPr/>
+            </p:nvSpPr>
+            <p:spPr>
+              <a:xfrm>
+                <a:off x="822960" y="1081400"/>
+                <a:ext cx="7520940" cy="3579849"/>
+              </a:xfrm>
+              <a:prstGeom prst="rect">
+                <a:avLst/>
+              </a:prstGeom>
+              <a:blipFill rotWithShape="1">
+                <a:blip r:embed="rId2"/>
+                <a:stretch>
+                  <a:fillRect l="-891" t="-850"/>
+                </a:stretch>
+              </a:blipFill>
+            </p:spPr>
+            <p:txBody>
+              <a:bodyPr/>
+              <a:lstStyle/>
+              <a:p>
+                <a:r>
+                  <a:rPr lang="en-US">
+                    <a:noFill/>
+                  </a:rPr>
+                  <a:t> </a:t>
+                </a:r>
+              </a:p>
+            </p:txBody>
+          </p:sp>
+        </mc:Fallback>
+      </mc:AlternateContent>
+      <p:sp>
+        <p:nvSpPr>
+          <p:cNvPr id="5" name="TextBox 4"/>
+          <p:cNvSpPr txBox="1"/>
           <p:nvPr/>
         </p:nvSpPr>
         <p:spPr>
           <a:xfrm>
-            <a:off x="822960" y="1081400"/>
-            <a:ext cx="7520940" cy="3579849"/>
+            <a:off x="4455632" y="1349463"/>
+            <a:ext cx="4631396" cy="3662541"/>
           </a:xfrm>
           <a:prstGeom prst="rect">
             <a:avLst/>
           </a:prstGeom>
+          <a:noFill/>
         </p:spPr>
         <p:txBody>
-          <a:bodyPr vert="horz" lIns="91440" tIns="45720" rIns="91440" bIns="45720" rtlCol="0">
-            <a:normAutofit/>
+          <a:bodyPr wrap="none" rtlCol="0">
+            <a:spAutoFit/>
           </a:bodyPr>
-          <a:lstStyle>
-            <a:lvl1pPr marL="342900" indent="-342900" algn="l" defTabSz="914400" rtl="0" eaLnBrk="1" latinLnBrk="0" hangingPunct="1">
-              <a:spcBef>
-                <a:spcPts val="800"/>
-              </a:spcBef>
-              <a:buFont typeface="Arial" pitchFamily="34" charset="0"/>
-              <a:buNone/>
-              <a:defRPr sz="1600" b="1" kern="1200">
-                <a:solidFill>
-                  <a:schemeClr val="tx1"/>
-                </a:solidFill>
-                <a:latin typeface="+mn-lt"/>
-                <a:ea typeface="+mn-ea"/>
-                <a:cs typeface="+mn-cs"/>
-              </a:defRPr>
-            </a:lvl1pPr>
-            <a:lvl2pPr marL="173736" indent="-173736" algn="l" defTabSz="914400" rtl="0" eaLnBrk="1" latinLnBrk="0" hangingPunct="1">
-              <a:spcBef>
-                <a:spcPts val="300"/>
-              </a:spcBef>
-              <a:buClr>
-                <a:schemeClr val="accent2"/>
-              </a:buClr>
-              <a:buFont typeface="Wingdings" pitchFamily="2" charset="2"/>
-              <a:buChar char="§"/>
-              <a:defRPr sz="1600" kern="1200">
-                <a:solidFill>
-                  <a:schemeClr val="tx1"/>
-                </a:solidFill>
-                <a:latin typeface="+mn-lt"/>
-                <a:ea typeface="+mn-ea"/>
-                <a:cs typeface="+mn-cs"/>
-              </a:defRPr>
-            </a:lvl2pPr>
-            <a:lvl3pPr marL="402336" indent="-164592" algn="l" defTabSz="914400" rtl="0" eaLnBrk="1" latinLnBrk="0" hangingPunct="1">
-              <a:spcBef>
-                <a:spcPts val="300"/>
-              </a:spcBef>
-              <a:buClr>
-                <a:schemeClr val="accent2"/>
-              </a:buClr>
-              <a:buFont typeface="Wingdings" pitchFamily="2" charset="2"/>
-              <a:buChar char="§"/>
-              <a:defRPr sz="1600" kern="1200">
-                <a:solidFill>
-                  <a:schemeClr val="tx1"/>
-                </a:solidFill>
-                <a:latin typeface="+mn-lt"/>
-                <a:ea typeface="+mn-ea"/>
-                <a:cs typeface="+mn-cs"/>
-              </a:defRPr>
-            </a:lvl3pPr>
-            <a:lvl4pPr marL="630936" indent="-164592" algn="l" defTabSz="914400" rtl="0" eaLnBrk="1" latinLnBrk="0" hangingPunct="1">
-              <a:spcBef>
-                <a:spcPts val="300"/>
-              </a:spcBef>
-              <a:buClr>
-                <a:schemeClr val="accent2"/>
-              </a:buClr>
-              <a:buFont typeface="Wingdings" pitchFamily="2" charset="2"/>
-              <a:buChar char="§"/>
-              <a:defRPr sz="1600" kern="1200">
-                <a:solidFill>
-                  <a:schemeClr val="tx1"/>
-                </a:solidFill>
-                <a:latin typeface="+mn-lt"/>
-                <a:ea typeface="+mn-ea"/>
-                <a:cs typeface="+mn-cs"/>
-              </a:defRPr>
-            </a:lvl4pPr>
-            <a:lvl5pPr marL="859536" indent="-173736" algn="l" defTabSz="914400" rtl="0" eaLnBrk="1" latinLnBrk="0" hangingPunct="1">
-              <a:spcBef>
-                <a:spcPts val="300"/>
-              </a:spcBef>
-              <a:buClr>
-                <a:schemeClr val="accent2"/>
-              </a:buClr>
-              <a:buFont typeface="Wingdings" pitchFamily="2" charset="2"/>
-              <a:buChar char="§"/>
-              <a:defRPr sz="1600" kern="1200">
-                <a:solidFill>
-                  <a:schemeClr val="tx1"/>
-                </a:solidFill>
-                <a:latin typeface="+mn-lt"/>
-                <a:ea typeface="+mn-ea"/>
-                <a:cs typeface="+mn-cs"/>
-              </a:defRPr>
-            </a:lvl5pPr>
-            <a:lvl6pPr marL="1097280" indent="-173736" algn="l" defTabSz="914400" rtl="0" eaLnBrk="1" latinLnBrk="0" hangingPunct="1">
-              <a:spcBef>
-                <a:spcPts val="300"/>
-              </a:spcBef>
-              <a:buClr>
-                <a:schemeClr val="accent2"/>
-              </a:buClr>
-              <a:buFont typeface="Wingdings" pitchFamily="2" charset="2"/>
-              <a:buChar char="§"/>
-              <a:defRPr sz="1400" kern="1200">
-                <a:solidFill>
-                  <a:schemeClr val="tx1"/>
-                </a:solidFill>
-                <a:latin typeface="+mn-lt"/>
-                <a:ea typeface="+mn-ea"/>
-                <a:cs typeface="+mn-cs"/>
-              </a:defRPr>
-            </a:lvl6pPr>
-            <a:lvl7pPr marL="1353312" indent="-164592" algn="l" defTabSz="914400" rtl="0" eaLnBrk="1" latinLnBrk="0" hangingPunct="1">
-              <a:spcBef>
-                <a:spcPts val="300"/>
-              </a:spcBef>
-              <a:buClr>
-                <a:schemeClr val="accent2"/>
-              </a:buClr>
-              <a:buFont typeface="Wingdings" pitchFamily="2" charset="2"/>
-              <a:buChar char="§"/>
-              <a:defRPr sz="1400" kern="1200">
-                <a:solidFill>
-                  <a:schemeClr val="tx1"/>
-                </a:solidFill>
-                <a:latin typeface="+mn-lt"/>
-                <a:ea typeface="+mn-ea"/>
-                <a:cs typeface="+mn-cs"/>
-              </a:defRPr>
-            </a:lvl7pPr>
-            <a:lvl8pPr marL="1581912" indent="-164592" algn="l" defTabSz="914400" rtl="0" eaLnBrk="1" latinLnBrk="0" hangingPunct="1">
-              <a:spcBef>
-                <a:spcPts val="300"/>
-              </a:spcBef>
-              <a:buClr>
-                <a:schemeClr val="accent2"/>
-              </a:buClr>
-              <a:buFont typeface="Wingdings" pitchFamily="2" charset="2"/>
-              <a:buChar char="§"/>
-              <a:defRPr sz="1400" kern="1200">
-                <a:solidFill>
-                  <a:schemeClr val="tx1"/>
-                </a:solidFill>
-                <a:latin typeface="+mn-lt"/>
-                <a:ea typeface="+mn-ea"/>
-                <a:cs typeface="+mn-cs"/>
-              </a:defRPr>
-            </a:lvl8pPr>
-            <a:lvl9pPr marL="1792224" indent="-164592" algn="l" defTabSz="914400" rtl="0" eaLnBrk="1" latinLnBrk="0" hangingPunct="1">
-              <a:spcBef>
-                <a:spcPts val="300"/>
-              </a:spcBef>
-              <a:buClr>
-                <a:schemeClr val="accent2"/>
-              </a:buClr>
-              <a:buFont typeface="Wingdings" pitchFamily="2" charset="2"/>
-              <a:buChar char="§"/>
-              <a:defRPr sz="1400" kern="1200">
-                <a:solidFill>
-                  <a:schemeClr val="tx1"/>
-                </a:solidFill>
-                <a:latin typeface="+mn-lt"/>
-                <a:ea typeface="+mn-ea"/>
-                <a:cs typeface="+mn-cs"/>
-              </a:defRPr>
-            </a:lvl9pPr>
-          </a:lstStyle>
-          <a:p>
-            <a:pPr lvl="1">
-              <a:buFont typeface="Arial"/>
-              <a:buChar char="•"/>
-            </a:pPr>
-            <a:r>
-              <a:rPr lang="en-US" sz="2200" dirty="0" smtClean="0"/>
-              <a:t>Dictionary</a:t>
-            </a:r>
-          </a:p>
-          <a:p>
-            <a:pPr lvl="2">
-              <a:buFont typeface="Arial"/>
-              <a:buChar char="•"/>
-            </a:pPr>
-            <a:r>
-              <a:rPr lang="en-US" sz="2200" dirty="0" smtClean="0"/>
-              <a:t>Best suited for our needs</a:t>
-            </a:r>
-          </a:p>
-          <a:p>
-            <a:pPr lvl="2">
-              <a:buFont typeface="Arial"/>
-              <a:buChar char="•"/>
-            </a:pPr>
-            <a:r>
-              <a:rPr lang="en-US" sz="2200" dirty="0" smtClean="0"/>
-              <a:t>Great time complexity</a:t>
-            </a:r>
-          </a:p>
-          <a:p>
-            <a:pPr lvl="3">
-              <a:buFont typeface="Arial"/>
-              <a:buChar char="•"/>
-            </a:pPr>
-            <a:r>
-              <a:rPr lang="en-US" sz="2200" dirty="0" smtClean="0"/>
-              <a:t>O(1) to retrieve </a:t>
-            </a:r>
-          </a:p>
-          <a:p>
-            <a:pPr lvl="2">
-              <a:buFont typeface="Arial"/>
-              <a:buChar char="•"/>
-            </a:pPr>
-            <a:endParaRPr lang="en-US" sz="2200" dirty="0" smtClean="0"/>
+          <a:lstStyle/>
+          <a:p>
+            <a:r>
+              <a:rPr lang="en-US" sz="800" dirty="0" smtClean="0">
+                <a:latin typeface="Courier New" panose="02070309020205020404" pitchFamily="49" charset="0"/>
+                <a:cs typeface="Courier New" panose="02070309020205020404" pitchFamily="49" charset="0"/>
+              </a:rPr>
+              <a:t>class </a:t>
+            </a:r>
+            <a:r>
+              <a:rPr lang="en-US" sz="800" dirty="0">
+                <a:latin typeface="Courier New" panose="02070309020205020404" pitchFamily="49" charset="0"/>
+                <a:cs typeface="Courier New" panose="02070309020205020404" pitchFamily="49" charset="0"/>
+              </a:rPr>
+              <a:t>DOC:</a:t>
+            </a:r>
+          </a:p>
+          <a:p>
+            <a:r>
+              <a:rPr lang="en-US" sz="800" dirty="0" smtClean="0">
+                <a:latin typeface="Courier New" panose="02070309020205020404" pitchFamily="49" charset="0"/>
+                <a:cs typeface="Courier New" panose="02070309020205020404" pitchFamily="49" charset="0"/>
+              </a:rPr>
+              <a:t>  # </a:t>
+            </a:r>
+            <a:r>
+              <a:rPr lang="en-US" sz="800" dirty="0">
+                <a:latin typeface="Courier New" panose="02070309020205020404" pitchFamily="49" charset="0"/>
+                <a:cs typeface="Courier New" panose="02070309020205020404" pitchFamily="49" charset="0"/>
+              </a:rPr>
+              <a:t>document frequency statically referenced</a:t>
+            </a:r>
+          </a:p>
+          <a:p>
+            <a:r>
+              <a:rPr lang="en-US" sz="800" dirty="0" smtClean="0">
+                <a:latin typeface="Courier New" panose="02070309020205020404" pitchFamily="49" charset="0"/>
+                <a:cs typeface="Courier New" panose="02070309020205020404" pitchFamily="49" charset="0"/>
+              </a:rPr>
+              <a:t>  # </a:t>
+            </a:r>
+            <a:r>
+              <a:rPr lang="en-US" sz="800" dirty="0">
+                <a:latin typeface="Courier New" panose="02070309020205020404" pitchFamily="49" charset="0"/>
+                <a:cs typeface="Courier New" panose="02070309020205020404" pitchFamily="49" charset="0"/>
+              </a:rPr>
+              <a:t>each key maps to an array of DOC references that have that key</a:t>
+            </a:r>
+          </a:p>
+          <a:p>
+            <a:r>
+              <a:rPr lang="en-US" sz="800" dirty="0">
+                <a:latin typeface="Courier New" panose="02070309020205020404" pitchFamily="49" charset="0"/>
+                <a:cs typeface="Courier New" panose="02070309020205020404" pitchFamily="49" charset="0"/>
+              </a:rPr>
+              <a:t> </a:t>
+            </a:r>
+            <a:r>
+              <a:rPr lang="en-US" sz="800" dirty="0" smtClean="0">
+                <a:latin typeface="Courier New" panose="02070309020205020404" pitchFamily="49" charset="0"/>
+                <a:cs typeface="Courier New" panose="02070309020205020404" pitchFamily="49" charset="0"/>
+              </a:rPr>
+              <a:t> </a:t>
+            </a:r>
+            <a:r>
+              <a:rPr lang="en-US" sz="800" dirty="0" err="1" smtClean="0">
+                <a:latin typeface="Courier New" panose="02070309020205020404" pitchFamily="49" charset="0"/>
+                <a:cs typeface="Courier New" panose="02070309020205020404" pitchFamily="49" charset="0"/>
+              </a:rPr>
+              <a:t>docsHave</a:t>
+            </a:r>
+            <a:r>
+              <a:rPr lang="en-US" sz="800" dirty="0" smtClean="0">
+                <a:latin typeface="Courier New" panose="02070309020205020404" pitchFamily="49" charset="0"/>
+                <a:cs typeface="Courier New" panose="02070309020205020404" pitchFamily="49" charset="0"/>
+              </a:rPr>
+              <a:t> </a:t>
+            </a:r>
+            <a:r>
+              <a:rPr lang="en-US" sz="800" dirty="0">
+                <a:latin typeface="Courier New" panose="02070309020205020404" pitchFamily="49" charset="0"/>
+                <a:cs typeface="Courier New" panose="02070309020205020404" pitchFamily="49" charset="0"/>
+              </a:rPr>
+              <a:t>= </a:t>
+            </a:r>
+            <a:r>
+              <a:rPr lang="en-US" sz="800" dirty="0" err="1">
+                <a:latin typeface="Courier New" panose="02070309020205020404" pitchFamily="49" charset="0"/>
+                <a:cs typeface="Courier New" panose="02070309020205020404" pitchFamily="49" charset="0"/>
+              </a:rPr>
+              <a:t>dict</a:t>
+            </a:r>
+            <a:r>
+              <a:rPr lang="en-US" sz="800" dirty="0" smtClean="0">
+                <a:latin typeface="Courier New" panose="02070309020205020404" pitchFamily="49" charset="0"/>
+                <a:cs typeface="Courier New" panose="02070309020205020404" pitchFamily="49" charset="0"/>
+              </a:rPr>
+              <a:t>()</a:t>
+            </a:r>
+            <a:r>
+              <a:rPr lang="en-US" sz="800" dirty="0">
+                <a:latin typeface="Courier New" panose="02070309020205020404" pitchFamily="49" charset="0"/>
+                <a:cs typeface="Courier New" panose="02070309020205020404" pitchFamily="49" charset="0"/>
+              </a:rPr>
+              <a:t/>
+            </a:r>
+            <a:br>
+              <a:rPr lang="en-US" sz="800" dirty="0">
+                <a:latin typeface="Courier New" panose="02070309020205020404" pitchFamily="49" charset="0"/>
+                <a:cs typeface="Courier New" panose="02070309020205020404" pitchFamily="49" charset="0"/>
+              </a:rPr>
+            </a:br>
+            <a:endParaRPr lang="en-US" sz="800" dirty="0">
+              <a:latin typeface="Courier New" panose="02070309020205020404" pitchFamily="49" charset="0"/>
+              <a:cs typeface="Courier New" panose="02070309020205020404" pitchFamily="49" charset="0"/>
+            </a:endParaRPr>
+          </a:p>
+          <a:p>
+            <a:r>
+              <a:rPr lang="en-US" sz="800" dirty="0" smtClean="0">
+                <a:latin typeface="Courier New" panose="02070309020205020404" pitchFamily="49" charset="0"/>
+                <a:cs typeface="Courier New" panose="02070309020205020404" pitchFamily="49" charset="0"/>
+              </a:rPr>
+              <a:t>  </a:t>
+            </a:r>
+            <a:r>
+              <a:rPr lang="en-US" sz="800" dirty="0" err="1" smtClean="0">
+                <a:latin typeface="Courier New" panose="02070309020205020404" pitchFamily="49" charset="0"/>
+                <a:cs typeface="Courier New" panose="02070309020205020404" pitchFamily="49" charset="0"/>
+              </a:rPr>
+              <a:t>def</a:t>
+            </a:r>
+            <a:r>
+              <a:rPr lang="en-US" sz="800" dirty="0" smtClean="0">
+                <a:latin typeface="Courier New" panose="02070309020205020404" pitchFamily="49" charset="0"/>
+                <a:cs typeface="Courier New" panose="02070309020205020404" pitchFamily="49" charset="0"/>
+              </a:rPr>
+              <a:t> </a:t>
+            </a:r>
+            <a:r>
+              <a:rPr lang="en-US" sz="800" dirty="0">
+                <a:latin typeface="Courier New" panose="02070309020205020404" pitchFamily="49" charset="0"/>
+                <a:cs typeface="Courier New" panose="02070309020205020404" pitchFamily="49" charset="0"/>
+              </a:rPr>
+              <a:t>__</a:t>
+            </a:r>
+            <a:r>
+              <a:rPr lang="en-US" sz="800" dirty="0" err="1">
+                <a:latin typeface="Courier New" panose="02070309020205020404" pitchFamily="49" charset="0"/>
+                <a:cs typeface="Courier New" panose="02070309020205020404" pitchFamily="49" charset="0"/>
+              </a:rPr>
+              <a:t>init</a:t>
+            </a:r>
+            <a:r>
+              <a:rPr lang="en-US" sz="800" dirty="0">
+                <a:latin typeface="Courier New" panose="02070309020205020404" pitchFamily="49" charset="0"/>
+                <a:cs typeface="Courier New" panose="02070309020205020404" pitchFamily="49" charset="0"/>
+              </a:rPr>
+              <a:t>__(self, file):</a:t>
+            </a:r>
+          </a:p>
+          <a:p>
+            <a:r>
+              <a:rPr lang="en-US" sz="800" dirty="0" smtClean="0">
+                <a:latin typeface="Courier New" panose="02070309020205020404" pitchFamily="49" charset="0"/>
+                <a:cs typeface="Courier New" panose="02070309020205020404" pitchFamily="49" charset="0"/>
+              </a:rPr>
+              <a:t>    # </a:t>
+            </a:r>
+            <a:r>
+              <a:rPr lang="en-US" sz="800" dirty="0">
+                <a:latin typeface="Courier New" panose="02070309020205020404" pitchFamily="49" charset="0"/>
+                <a:cs typeface="Courier New" panose="02070309020205020404" pitchFamily="49" charset="0"/>
+              </a:rPr>
+              <a:t>prep the xml parser</a:t>
+            </a:r>
+          </a:p>
+          <a:p>
+            <a:r>
+              <a:rPr lang="en-US" sz="800" dirty="0" smtClean="0">
+                <a:latin typeface="Courier New" panose="02070309020205020404" pitchFamily="49" charset="0"/>
+                <a:cs typeface="Courier New" panose="02070309020205020404" pitchFamily="49" charset="0"/>
+              </a:rPr>
+              <a:t>    doc </a:t>
+            </a:r>
+            <a:r>
+              <a:rPr lang="en-US" sz="800" dirty="0">
+                <a:latin typeface="Courier New" panose="02070309020205020404" pitchFamily="49" charset="0"/>
+                <a:cs typeface="Courier New" panose="02070309020205020404" pitchFamily="49" charset="0"/>
+              </a:rPr>
+              <a:t>= </a:t>
+            </a:r>
+            <a:r>
+              <a:rPr lang="en-US" sz="800" dirty="0" err="1">
+                <a:latin typeface="Courier New" panose="02070309020205020404" pitchFamily="49" charset="0"/>
+                <a:cs typeface="Courier New" panose="02070309020205020404" pitchFamily="49" charset="0"/>
+              </a:rPr>
+              <a:t>xml.parse</a:t>
+            </a:r>
+            <a:r>
+              <a:rPr lang="en-US" sz="800" dirty="0">
+                <a:latin typeface="Courier New" panose="02070309020205020404" pitchFamily="49" charset="0"/>
+                <a:cs typeface="Courier New" panose="02070309020205020404" pitchFamily="49" charset="0"/>
+              </a:rPr>
+              <a:t>("documents/" + file).</a:t>
+            </a:r>
+            <a:r>
+              <a:rPr lang="en-US" sz="800" dirty="0" err="1">
+                <a:latin typeface="Courier New" panose="02070309020205020404" pitchFamily="49" charset="0"/>
+                <a:cs typeface="Courier New" panose="02070309020205020404" pitchFamily="49" charset="0"/>
+              </a:rPr>
+              <a:t>getroot</a:t>
+            </a:r>
+            <a:r>
+              <a:rPr lang="en-US" sz="800" dirty="0">
+                <a:latin typeface="Courier New" panose="02070309020205020404" pitchFamily="49" charset="0"/>
+                <a:cs typeface="Courier New" panose="02070309020205020404" pitchFamily="49" charset="0"/>
+              </a:rPr>
+              <a:t>()</a:t>
+            </a:r>
+          </a:p>
+          <a:p>
+            <a:endParaRPr lang="en-US" sz="800" dirty="0" smtClean="0">
+              <a:latin typeface="Courier New" panose="02070309020205020404" pitchFamily="49" charset="0"/>
+              <a:cs typeface="Courier New" panose="02070309020205020404" pitchFamily="49" charset="0"/>
+            </a:endParaRPr>
+          </a:p>
+          <a:p>
+            <a:r>
+              <a:rPr lang="en-US" sz="800" dirty="0">
+                <a:latin typeface="Courier New" panose="02070309020205020404" pitchFamily="49" charset="0"/>
+                <a:cs typeface="Courier New" panose="02070309020205020404" pitchFamily="49" charset="0"/>
+              </a:rPr>
+              <a:t> </a:t>
+            </a:r>
+            <a:r>
+              <a:rPr lang="en-US" sz="800" dirty="0" smtClean="0">
+                <a:latin typeface="Courier New" panose="02070309020205020404" pitchFamily="49" charset="0"/>
+                <a:cs typeface="Courier New" panose="02070309020205020404" pitchFamily="49" charset="0"/>
+              </a:rPr>
+              <a:t>   # </a:t>
+            </a:r>
+            <a:r>
+              <a:rPr lang="en-US" sz="800" dirty="0">
+                <a:latin typeface="Courier New" panose="02070309020205020404" pitchFamily="49" charset="0"/>
+                <a:cs typeface="Courier New" panose="02070309020205020404" pitchFamily="49" charset="0"/>
+              </a:rPr>
+              <a:t>index words in document</a:t>
+            </a:r>
+          </a:p>
+          <a:p>
+            <a:r>
+              <a:rPr lang="en-US" sz="800" dirty="0" smtClean="0">
+                <a:latin typeface="Courier New" panose="02070309020205020404" pitchFamily="49" charset="0"/>
+                <a:cs typeface="Courier New" panose="02070309020205020404" pitchFamily="49" charset="0"/>
+              </a:rPr>
+              <a:t>    </a:t>
+            </a:r>
+            <a:r>
+              <a:rPr lang="en-US" sz="800" dirty="0" err="1" smtClean="0">
+                <a:latin typeface="Courier New" panose="02070309020205020404" pitchFamily="49" charset="0"/>
+                <a:cs typeface="Courier New" panose="02070309020205020404" pitchFamily="49" charset="0"/>
+              </a:rPr>
+              <a:t>self.docHas</a:t>
+            </a:r>
+            <a:r>
+              <a:rPr lang="en-US" sz="800" dirty="0" smtClean="0">
+                <a:latin typeface="Courier New" panose="02070309020205020404" pitchFamily="49" charset="0"/>
+                <a:cs typeface="Courier New" panose="02070309020205020404" pitchFamily="49" charset="0"/>
+              </a:rPr>
+              <a:t> </a:t>
+            </a:r>
+            <a:r>
+              <a:rPr lang="en-US" sz="800" dirty="0">
+                <a:latin typeface="Courier New" panose="02070309020205020404" pitchFamily="49" charset="0"/>
+                <a:cs typeface="Courier New" panose="02070309020205020404" pitchFamily="49" charset="0"/>
+              </a:rPr>
+              <a:t>= </a:t>
+            </a:r>
+            <a:r>
+              <a:rPr lang="en-US" sz="800" dirty="0" err="1">
+                <a:latin typeface="Courier New" panose="02070309020205020404" pitchFamily="49" charset="0"/>
+                <a:cs typeface="Courier New" panose="02070309020205020404" pitchFamily="49" charset="0"/>
+              </a:rPr>
+              <a:t>dict</a:t>
+            </a:r>
+            <a:r>
+              <a:rPr lang="en-US" sz="800" dirty="0">
+                <a:latin typeface="Courier New" panose="02070309020205020404" pitchFamily="49" charset="0"/>
+                <a:cs typeface="Courier New" panose="02070309020205020404" pitchFamily="49" charset="0"/>
+              </a:rPr>
+              <a:t>()</a:t>
+            </a:r>
+          </a:p>
+          <a:p>
+            <a:r>
+              <a:rPr lang="en-US" sz="800" dirty="0" smtClean="0">
+                <a:latin typeface="Courier New" panose="02070309020205020404" pitchFamily="49" charset="0"/>
+                <a:cs typeface="Courier New" panose="02070309020205020404" pitchFamily="49" charset="0"/>
+              </a:rPr>
+              <a:t>    </a:t>
+            </a:r>
+            <a:r>
+              <a:rPr lang="en-US" sz="800" dirty="0" err="1" smtClean="0">
+                <a:latin typeface="Courier New" panose="02070309020205020404" pitchFamily="49" charset="0"/>
+                <a:cs typeface="Courier New" panose="02070309020205020404" pitchFamily="49" charset="0"/>
+              </a:rPr>
+              <a:t>self</a:t>
+            </a:r>
+            <a:r>
+              <a:rPr lang="en-US" sz="800" dirty="0" err="1">
+                <a:latin typeface="Courier New" panose="02070309020205020404" pitchFamily="49" charset="0"/>
+                <a:cs typeface="Courier New" panose="02070309020205020404" pitchFamily="49" charset="0"/>
+              </a:rPr>
+              <a:t>.__index</a:t>
+            </a:r>
+            <a:r>
+              <a:rPr lang="en-US" sz="800" dirty="0">
+                <a:latin typeface="Courier New" panose="02070309020205020404" pitchFamily="49" charset="0"/>
+                <a:cs typeface="Courier New" panose="02070309020205020404" pitchFamily="49" charset="0"/>
+              </a:rPr>
+              <a:t>(</a:t>
+            </a:r>
+            <a:r>
+              <a:rPr lang="en-US" sz="800" dirty="0" err="1">
+                <a:latin typeface="Courier New" panose="02070309020205020404" pitchFamily="49" charset="0"/>
+                <a:cs typeface="Courier New" panose="02070309020205020404" pitchFamily="49" charset="0"/>
+              </a:rPr>
+              <a:t>self.title</a:t>
+            </a:r>
+            <a:r>
+              <a:rPr lang="en-US" sz="800" dirty="0">
+                <a:latin typeface="Courier New" panose="02070309020205020404" pitchFamily="49" charset="0"/>
+                <a:cs typeface="Courier New" panose="02070309020205020404" pitchFamily="49" charset="0"/>
+              </a:rPr>
+              <a:t>)</a:t>
+            </a:r>
+          </a:p>
+          <a:p>
+            <a:r>
+              <a:rPr lang="en-US" sz="800" dirty="0" smtClean="0">
+                <a:latin typeface="Courier New" panose="02070309020205020404" pitchFamily="49" charset="0"/>
+                <a:cs typeface="Courier New" panose="02070309020205020404" pitchFamily="49" charset="0"/>
+              </a:rPr>
+              <a:t>    </a:t>
+            </a:r>
+            <a:r>
+              <a:rPr lang="en-US" sz="800" dirty="0" err="1" smtClean="0">
+                <a:latin typeface="Courier New" panose="02070309020205020404" pitchFamily="49" charset="0"/>
+                <a:cs typeface="Courier New" panose="02070309020205020404" pitchFamily="49" charset="0"/>
+              </a:rPr>
+              <a:t>self</a:t>
+            </a:r>
+            <a:r>
+              <a:rPr lang="en-US" sz="800" dirty="0" err="1">
+                <a:latin typeface="Courier New" panose="02070309020205020404" pitchFamily="49" charset="0"/>
+                <a:cs typeface="Courier New" panose="02070309020205020404" pitchFamily="49" charset="0"/>
+              </a:rPr>
+              <a:t>.__index</a:t>
+            </a:r>
+            <a:r>
+              <a:rPr lang="en-US" sz="800" dirty="0">
+                <a:latin typeface="Courier New" panose="02070309020205020404" pitchFamily="49" charset="0"/>
+                <a:cs typeface="Courier New" panose="02070309020205020404" pitchFamily="49" charset="0"/>
+              </a:rPr>
+              <a:t>(</a:t>
+            </a:r>
+            <a:r>
+              <a:rPr lang="en-US" sz="800" dirty="0" err="1">
+                <a:latin typeface="Courier New" panose="02070309020205020404" pitchFamily="49" charset="0"/>
+                <a:cs typeface="Courier New" panose="02070309020205020404" pitchFamily="49" charset="0"/>
+              </a:rPr>
+              <a:t>self.author</a:t>
+            </a:r>
+            <a:r>
+              <a:rPr lang="en-US" sz="800" dirty="0">
+                <a:latin typeface="Courier New" panose="02070309020205020404" pitchFamily="49" charset="0"/>
+                <a:cs typeface="Courier New" panose="02070309020205020404" pitchFamily="49" charset="0"/>
+              </a:rPr>
+              <a:t>)</a:t>
+            </a:r>
+          </a:p>
+          <a:p>
+            <a:r>
+              <a:rPr lang="en-US" sz="800" dirty="0" smtClean="0">
+                <a:latin typeface="Courier New" panose="02070309020205020404" pitchFamily="49" charset="0"/>
+                <a:cs typeface="Courier New" panose="02070309020205020404" pitchFamily="49" charset="0"/>
+              </a:rPr>
+              <a:t>    </a:t>
+            </a:r>
+            <a:r>
+              <a:rPr lang="en-US" sz="800" dirty="0" err="1" smtClean="0">
+                <a:latin typeface="Courier New" panose="02070309020205020404" pitchFamily="49" charset="0"/>
+                <a:cs typeface="Courier New" panose="02070309020205020404" pitchFamily="49" charset="0"/>
+              </a:rPr>
+              <a:t>self</a:t>
+            </a:r>
+            <a:r>
+              <a:rPr lang="en-US" sz="800" dirty="0" err="1">
+                <a:latin typeface="Courier New" panose="02070309020205020404" pitchFamily="49" charset="0"/>
+                <a:cs typeface="Courier New" panose="02070309020205020404" pitchFamily="49" charset="0"/>
+              </a:rPr>
+              <a:t>.__index</a:t>
+            </a:r>
+            <a:r>
+              <a:rPr lang="en-US" sz="800" dirty="0">
+                <a:latin typeface="Courier New" panose="02070309020205020404" pitchFamily="49" charset="0"/>
+                <a:cs typeface="Courier New" panose="02070309020205020404" pitchFamily="49" charset="0"/>
+              </a:rPr>
+              <a:t>(</a:t>
+            </a:r>
+            <a:r>
+              <a:rPr lang="en-US" sz="800" dirty="0" err="1">
+                <a:latin typeface="Courier New" panose="02070309020205020404" pitchFamily="49" charset="0"/>
+                <a:cs typeface="Courier New" panose="02070309020205020404" pitchFamily="49" charset="0"/>
+              </a:rPr>
+              <a:t>self.biblio</a:t>
+            </a:r>
+            <a:r>
+              <a:rPr lang="en-US" sz="800" dirty="0">
+                <a:latin typeface="Courier New" panose="02070309020205020404" pitchFamily="49" charset="0"/>
+                <a:cs typeface="Courier New" panose="02070309020205020404" pitchFamily="49" charset="0"/>
+              </a:rPr>
+              <a:t>)</a:t>
+            </a:r>
+          </a:p>
+          <a:p>
+            <a:r>
+              <a:rPr lang="en-US" sz="800" dirty="0" smtClean="0">
+                <a:latin typeface="Courier New" panose="02070309020205020404" pitchFamily="49" charset="0"/>
+                <a:cs typeface="Courier New" panose="02070309020205020404" pitchFamily="49" charset="0"/>
+              </a:rPr>
+              <a:t>    </a:t>
+            </a:r>
+            <a:r>
+              <a:rPr lang="en-US" sz="800" dirty="0" err="1" smtClean="0">
+                <a:latin typeface="Courier New" panose="02070309020205020404" pitchFamily="49" charset="0"/>
+                <a:cs typeface="Courier New" panose="02070309020205020404" pitchFamily="49" charset="0"/>
+              </a:rPr>
+              <a:t>self</a:t>
+            </a:r>
+            <a:r>
+              <a:rPr lang="en-US" sz="800" dirty="0" err="1">
+                <a:latin typeface="Courier New" panose="02070309020205020404" pitchFamily="49" charset="0"/>
+                <a:cs typeface="Courier New" panose="02070309020205020404" pitchFamily="49" charset="0"/>
+              </a:rPr>
+              <a:t>.__index</a:t>
+            </a:r>
+            <a:r>
+              <a:rPr lang="en-US" sz="800" dirty="0">
+                <a:latin typeface="Courier New" panose="02070309020205020404" pitchFamily="49" charset="0"/>
+                <a:cs typeface="Courier New" panose="02070309020205020404" pitchFamily="49" charset="0"/>
+              </a:rPr>
+              <a:t>(</a:t>
+            </a:r>
+            <a:r>
+              <a:rPr lang="en-US" sz="800" dirty="0" err="1">
+                <a:latin typeface="Courier New" panose="02070309020205020404" pitchFamily="49" charset="0"/>
+                <a:cs typeface="Courier New" panose="02070309020205020404" pitchFamily="49" charset="0"/>
+              </a:rPr>
+              <a:t>self.text</a:t>
+            </a:r>
+            <a:r>
+              <a:rPr lang="en-US" sz="800" dirty="0" smtClean="0">
+                <a:latin typeface="Courier New" panose="02070309020205020404" pitchFamily="49" charset="0"/>
+                <a:cs typeface="Courier New" panose="02070309020205020404" pitchFamily="49" charset="0"/>
+              </a:rPr>
+              <a:t>)</a:t>
+            </a:r>
+            <a:r>
+              <a:rPr lang="en-US" sz="800" dirty="0">
+                <a:latin typeface="Courier New" panose="02070309020205020404" pitchFamily="49" charset="0"/>
+                <a:cs typeface="Courier New" panose="02070309020205020404" pitchFamily="49" charset="0"/>
+              </a:rPr>
+              <a:t/>
+            </a:r>
+            <a:br>
+              <a:rPr lang="en-US" sz="800" dirty="0">
+                <a:latin typeface="Courier New" panose="02070309020205020404" pitchFamily="49" charset="0"/>
+                <a:cs typeface="Courier New" panose="02070309020205020404" pitchFamily="49" charset="0"/>
+              </a:rPr>
+            </a:br>
+            <a:endParaRPr lang="en-US" sz="800" dirty="0">
+              <a:latin typeface="Courier New" panose="02070309020205020404" pitchFamily="49" charset="0"/>
+              <a:cs typeface="Courier New" panose="02070309020205020404" pitchFamily="49" charset="0"/>
+            </a:endParaRPr>
+          </a:p>
+          <a:p>
+            <a:r>
+              <a:rPr lang="en-US" sz="800" dirty="0" smtClean="0">
+                <a:latin typeface="Courier New" panose="02070309020205020404" pitchFamily="49" charset="0"/>
+                <a:cs typeface="Courier New" panose="02070309020205020404" pitchFamily="49" charset="0"/>
+              </a:rPr>
+              <a:t>  </a:t>
+            </a:r>
+            <a:r>
+              <a:rPr lang="en-US" sz="800" dirty="0" err="1" smtClean="0">
+                <a:latin typeface="Courier New" panose="02070309020205020404" pitchFamily="49" charset="0"/>
+                <a:cs typeface="Courier New" panose="02070309020205020404" pitchFamily="49" charset="0"/>
+              </a:rPr>
+              <a:t>def</a:t>
+            </a:r>
+            <a:r>
+              <a:rPr lang="en-US" sz="800" dirty="0" smtClean="0">
+                <a:latin typeface="Courier New" panose="02070309020205020404" pitchFamily="49" charset="0"/>
+                <a:cs typeface="Courier New" panose="02070309020205020404" pitchFamily="49" charset="0"/>
+              </a:rPr>
+              <a:t> </a:t>
+            </a:r>
+            <a:r>
+              <a:rPr lang="en-US" sz="800" dirty="0">
+                <a:latin typeface="Courier New" panose="02070309020205020404" pitchFamily="49" charset="0"/>
+                <a:cs typeface="Courier New" panose="02070309020205020404" pitchFamily="49" charset="0"/>
+              </a:rPr>
+              <a:t>__index(self, </a:t>
+            </a:r>
+            <a:r>
+              <a:rPr lang="en-US" sz="800" dirty="0" err="1">
+                <a:latin typeface="Courier New" panose="02070309020205020404" pitchFamily="49" charset="0"/>
+                <a:cs typeface="Courier New" panose="02070309020205020404" pitchFamily="49" charset="0"/>
+              </a:rPr>
+              <a:t>str</a:t>
+            </a:r>
+            <a:r>
+              <a:rPr lang="en-US" sz="800" dirty="0">
+                <a:latin typeface="Courier New" panose="02070309020205020404" pitchFamily="49" charset="0"/>
+                <a:cs typeface="Courier New" panose="02070309020205020404" pitchFamily="49" charset="0"/>
+              </a:rPr>
+              <a:t>):</a:t>
+            </a:r>
+          </a:p>
+          <a:p>
+            <a:r>
+              <a:rPr lang="en-US" sz="800" dirty="0" smtClean="0">
+                <a:latin typeface="Courier New" panose="02070309020205020404" pitchFamily="49" charset="0"/>
+                <a:cs typeface="Courier New" panose="02070309020205020404" pitchFamily="49" charset="0"/>
+              </a:rPr>
+              <a:t>    # </a:t>
+            </a:r>
+            <a:r>
+              <a:rPr lang="en-US" sz="800" dirty="0">
+                <a:latin typeface="Courier New" panose="02070309020205020404" pitchFamily="49" charset="0"/>
+                <a:cs typeface="Courier New" panose="02070309020205020404" pitchFamily="49" charset="0"/>
+              </a:rPr>
+              <a:t>replace punctuation delimiters with whitespace delimiters and split</a:t>
+            </a:r>
+          </a:p>
+          <a:p>
+            <a:r>
+              <a:rPr lang="en-US" sz="800" dirty="0" smtClean="0">
+                <a:latin typeface="Courier New" panose="02070309020205020404" pitchFamily="49" charset="0"/>
+                <a:cs typeface="Courier New" panose="02070309020205020404" pitchFamily="49" charset="0"/>
+              </a:rPr>
+              <a:t>    for </a:t>
+            </a:r>
+            <a:r>
+              <a:rPr lang="en-US" sz="800" dirty="0">
+                <a:latin typeface="Courier New" panose="02070309020205020404" pitchFamily="49" charset="0"/>
+                <a:cs typeface="Courier New" panose="02070309020205020404" pitchFamily="49" charset="0"/>
+              </a:rPr>
+              <a:t>word in </a:t>
+            </a:r>
+            <a:r>
+              <a:rPr lang="en-US" sz="800" dirty="0" err="1">
+                <a:latin typeface="Courier New" panose="02070309020205020404" pitchFamily="49" charset="0"/>
+                <a:cs typeface="Courier New" panose="02070309020205020404" pitchFamily="49" charset="0"/>
+              </a:rPr>
+              <a:t>re.sub</a:t>
+            </a:r>
+            <a:r>
+              <a:rPr lang="en-US" sz="800" dirty="0">
+                <a:latin typeface="Courier New" panose="02070309020205020404" pitchFamily="49" charset="0"/>
+                <a:cs typeface="Courier New" panose="02070309020205020404" pitchFamily="49" charset="0"/>
+              </a:rPr>
+              <a:t>('[^\w]+', ' ', </a:t>
+            </a:r>
+            <a:r>
+              <a:rPr lang="en-US" sz="800" dirty="0" err="1">
+                <a:latin typeface="Courier New" panose="02070309020205020404" pitchFamily="49" charset="0"/>
+                <a:cs typeface="Courier New" panose="02070309020205020404" pitchFamily="49" charset="0"/>
+              </a:rPr>
+              <a:t>str.upper</a:t>
+            </a:r>
+            <a:r>
+              <a:rPr lang="en-US" sz="800" dirty="0">
+                <a:latin typeface="Courier New" panose="02070309020205020404" pitchFamily="49" charset="0"/>
+                <a:cs typeface="Courier New" panose="02070309020205020404" pitchFamily="49" charset="0"/>
+              </a:rPr>
+              <a:t>()).split(): </a:t>
+            </a:r>
+          </a:p>
+          <a:p>
+            <a:endParaRPr lang="en-US" sz="800" dirty="0" smtClean="0">
+              <a:latin typeface="Courier New" panose="02070309020205020404" pitchFamily="49" charset="0"/>
+              <a:cs typeface="Courier New" panose="02070309020205020404" pitchFamily="49" charset="0"/>
+            </a:endParaRPr>
+          </a:p>
+          <a:p>
+            <a:r>
+              <a:rPr lang="en-US" sz="800" dirty="0" smtClean="0">
+                <a:latin typeface="Courier New" panose="02070309020205020404" pitchFamily="49" charset="0"/>
+                <a:cs typeface="Courier New" panose="02070309020205020404" pitchFamily="49" charset="0"/>
+              </a:rPr>
+              <a:t>    # </a:t>
+            </a:r>
+            <a:r>
+              <a:rPr lang="en-US" sz="800" dirty="0">
+                <a:latin typeface="Courier New" panose="02070309020205020404" pitchFamily="49" charset="0"/>
+                <a:cs typeface="Courier New" panose="02070309020205020404" pitchFamily="49" charset="0"/>
+              </a:rPr>
+              <a:t>don't index unnecessarily short words or numbers</a:t>
+            </a:r>
+          </a:p>
+          <a:p>
+            <a:r>
+              <a:rPr lang="en-US" sz="800" dirty="0" smtClean="0">
+                <a:latin typeface="Courier New" panose="02070309020205020404" pitchFamily="49" charset="0"/>
+                <a:cs typeface="Courier New" panose="02070309020205020404" pitchFamily="49" charset="0"/>
+              </a:rPr>
+              <a:t>    if </a:t>
+            </a:r>
+            <a:r>
+              <a:rPr lang="en-US" sz="800" dirty="0">
+                <a:latin typeface="Courier New" panose="02070309020205020404" pitchFamily="49" charset="0"/>
+                <a:cs typeface="Courier New" panose="02070309020205020404" pitchFamily="49" charset="0"/>
+              </a:rPr>
+              <a:t>word not in </a:t>
+            </a:r>
+            <a:r>
+              <a:rPr lang="en-US" sz="800" dirty="0" err="1">
+                <a:latin typeface="Courier New" panose="02070309020205020404" pitchFamily="49" charset="0"/>
+                <a:cs typeface="Courier New" panose="02070309020205020404" pitchFamily="49" charset="0"/>
+              </a:rPr>
+              <a:t>stopWords</a:t>
+            </a:r>
+            <a:r>
+              <a:rPr lang="en-US" sz="800" dirty="0">
+                <a:latin typeface="Courier New" panose="02070309020205020404" pitchFamily="49" charset="0"/>
+                <a:cs typeface="Courier New" panose="02070309020205020404" pitchFamily="49" charset="0"/>
+              </a:rPr>
+              <a:t> and </a:t>
+            </a:r>
+            <a:r>
+              <a:rPr lang="en-US" sz="800" dirty="0" err="1">
+                <a:latin typeface="Courier New" panose="02070309020205020404" pitchFamily="49" charset="0"/>
+                <a:cs typeface="Courier New" panose="02070309020205020404" pitchFamily="49" charset="0"/>
+              </a:rPr>
+              <a:t>re.search</a:t>
+            </a:r>
+            <a:r>
+              <a:rPr lang="en-US" sz="800" dirty="0">
+                <a:latin typeface="Courier New" panose="02070309020205020404" pitchFamily="49" charset="0"/>
+                <a:cs typeface="Courier New" panose="02070309020205020404" pitchFamily="49" charset="0"/>
+              </a:rPr>
+              <a:t>('[a-</a:t>
+            </a:r>
+            <a:r>
+              <a:rPr lang="en-US" sz="800" dirty="0" err="1">
+                <a:latin typeface="Courier New" panose="02070309020205020404" pitchFamily="49" charset="0"/>
+                <a:cs typeface="Courier New" panose="02070309020205020404" pitchFamily="49" charset="0"/>
+              </a:rPr>
+              <a:t>zA</a:t>
+            </a:r>
+            <a:r>
+              <a:rPr lang="en-US" sz="800" dirty="0">
+                <a:latin typeface="Courier New" panose="02070309020205020404" pitchFamily="49" charset="0"/>
+                <a:cs typeface="Courier New" panose="02070309020205020404" pitchFamily="49" charset="0"/>
+              </a:rPr>
+              <a:t>-Z]', word): </a:t>
+            </a:r>
+          </a:p>
+          <a:p>
+            <a:r>
+              <a:rPr lang="en-US" sz="800" dirty="0" smtClean="0">
+                <a:latin typeface="Courier New" panose="02070309020205020404" pitchFamily="49" charset="0"/>
+                <a:cs typeface="Courier New" panose="02070309020205020404" pitchFamily="49" charset="0"/>
+              </a:rPr>
+              <a:t>      if </a:t>
+            </a:r>
+            <a:r>
+              <a:rPr lang="en-US" sz="800" dirty="0">
+                <a:latin typeface="Courier New" panose="02070309020205020404" pitchFamily="49" charset="0"/>
+                <a:cs typeface="Courier New" panose="02070309020205020404" pitchFamily="49" charset="0"/>
+              </a:rPr>
+              <a:t>not word in </a:t>
+            </a:r>
+            <a:r>
+              <a:rPr lang="en-US" sz="800" dirty="0" err="1">
+                <a:latin typeface="Courier New" panose="02070309020205020404" pitchFamily="49" charset="0"/>
+                <a:cs typeface="Courier New" panose="02070309020205020404" pitchFamily="49" charset="0"/>
+              </a:rPr>
+              <a:t>DOC.docsHave</a:t>
+            </a:r>
+            <a:r>
+              <a:rPr lang="en-US" sz="800" dirty="0">
+                <a:latin typeface="Courier New" panose="02070309020205020404" pitchFamily="49" charset="0"/>
+                <a:cs typeface="Courier New" panose="02070309020205020404" pitchFamily="49" charset="0"/>
+              </a:rPr>
+              <a:t>:</a:t>
+            </a:r>
+          </a:p>
+          <a:p>
+            <a:r>
+              <a:rPr lang="en-US" sz="800" dirty="0" smtClean="0">
+                <a:latin typeface="Courier New" panose="02070309020205020404" pitchFamily="49" charset="0"/>
+                <a:cs typeface="Courier New" panose="02070309020205020404" pitchFamily="49" charset="0"/>
+              </a:rPr>
+              <a:t>        </a:t>
+            </a:r>
+            <a:r>
+              <a:rPr lang="en-US" sz="800" dirty="0" err="1" smtClean="0">
+                <a:latin typeface="Courier New" panose="02070309020205020404" pitchFamily="49" charset="0"/>
+                <a:cs typeface="Courier New" panose="02070309020205020404" pitchFamily="49" charset="0"/>
+              </a:rPr>
+              <a:t>DOC.docsHave</a:t>
+            </a:r>
+            <a:r>
+              <a:rPr lang="en-US" sz="800" dirty="0" smtClean="0">
+                <a:latin typeface="Courier New" panose="02070309020205020404" pitchFamily="49" charset="0"/>
+                <a:cs typeface="Courier New" panose="02070309020205020404" pitchFamily="49" charset="0"/>
+              </a:rPr>
+              <a:t>[word</a:t>
+            </a:r>
+            <a:r>
+              <a:rPr lang="en-US" sz="800" dirty="0">
+                <a:latin typeface="Courier New" panose="02070309020205020404" pitchFamily="49" charset="0"/>
+                <a:cs typeface="Courier New" panose="02070309020205020404" pitchFamily="49" charset="0"/>
+              </a:rPr>
+              <a:t>] = []</a:t>
+            </a:r>
+          </a:p>
+          <a:p>
+            <a:r>
+              <a:rPr lang="en-US" sz="800" dirty="0" smtClean="0">
+                <a:latin typeface="Courier New" panose="02070309020205020404" pitchFamily="49" charset="0"/>
+                <a:cs typeface="Courier New" panose="02070309020205020404" pitchFamily="49" charset="0"/>
+              </a:rPr>
+              <a:t>      if </a:t>
+            </a:r>
+            <a:r>
+              <a:rPr lang="en-US" sz="800" dirty="0">
+                <a:latin typeface="Courier New" panose="02070309020205020404" pitchFamily="49" charset="0"/>
+                <a:cs typeface="Courier New" panose="02070309020205020404" pitchFamily="49" charset="0"/>
+              </a:rPr>
+              <a:t>not word in </a:t>
+            </a:r>
+            <a:r>
+              <a:rPr lang="en-US" sz="800" dirty="0" err="1">
+                <a:latin typeface="Courier New" panose="02070309020205020404" pitchFamily="49" charset="0"/>
+                <a:cs typeface="Courier New" panose="02070309020205020404" pitchFamily="49" charset="0"/>
+              </a:rPr>
+              <a:t>self.docHas</a:t>
+            </a:r>
+            <a:r>
+              <a:rPr lang="en-US" sz="800" dirty="0">
+                <a:latin typeface="Courier New" panose="02070309020205020404" pitchFamily="49" charset="0"/>
+                <a:cs typeface="Courier New" panose="02070309020205020404" pitchFamily="49" charset="0"/>
+              </a:rPr>
+              <a:t>:</a:t>
+            </a:r>
+          </a:p>
+          <a:p>
+            <a:r>
+              <a:rPr lang="en-US" sz="800" dirty="0" smtClean="0">
+                <a:latin typeface="Courier New" panose="02070309020205020404" pitchFamily="49" charset="0"/>
+                <a:cs typeface="Courier New" panose="02070309020205020404" pitchFamily="49" charset="0"/>
+              </a:rPr>
+              <a:t>        </a:t>
+            </a:r>
+            <a:r>
+              <a:rPr lang="en-US" sz="800" dirty="0" err="1" smtClean="0">
+                <a:latin typeface="Courier New" panose="02070309020205020404" pitchFamily="49" charset="0"/>
+                <a:cs typeface="Courier New" panose="02070309020205020404" pitchFamily="49" charset="0"/>
+              </a:rPr>
+              <a:t>DOC.docsHave</a:t>
+            </a:r>
+            <a:r>
+              <a:rPr lang="en-US" sz="800" dirty="0" smtClean="0">
+                <a:latin typeface="Courier New" panose="02070309020205020404" pitchFamily="49" charset="0"/>
+                <a:cs typeface="Courier New" panose="02070309020205020404" pitchFamily="49" charset="0"/>
+              </a:rPr>
+              <a:t>[word</a:t>
+            </a:r>
+            <a:r>
+              <a:rPr lang="en-US" sz="800" dirty="0">
+                <a:latin typeface="Courier New" panose="02070309020205020404" pitchFamily="49" charset="0"/>
+                <a:cs typeface="Courier New" panose="02070309020205020404" pitchFamily="49" charset="0"/>
+              </a:rPr>
+              <a:t>].append(self)</a:t>
+            </a:r>
+          </a:p>
+          <a:p>
+            <a:r>
+              <a:rPr lang="en-US" sz="800" dirty="0" smtClean="0">
+                <a:latin typeface="Courier New" panose="02070309020205020404" pitchFamily="49" charset="0"/>
+                <a:cs typeface="Courier New" panose="02070309020205020404" pitchFamily="49" charset="0"/>
+              </a:rPr>
+              <a:t>      </a:t>
+            </a:r>
+            <a:r>
+              <a:rPr lang="en-US" sz="800" dirty="0" err="1" smtClean="0">
+                <a:latin typeface="Courier New" panose="02070309020205020404" pitchFamily="49" charset="0"/>
+                <a:cs typeface="Courier New" panose="02070309020205020404" pitchFamily="49" charset="0"/>
+              </a:rPr>
+              <a:t>self.docHas</a:t>
+            </a:r>
+            <a:r>
+              <a:rPr lang="en-US" sz="800" dirty="0" smtClean="0">
+                <a:latin typeface="Courier New" panose="02070309020205020404" pitchFamily="49" charset="0"/>
+                <a:cs typeface="Courier New" panose="02070309020205020404" pitchFamily="49" charset="0"/>
+              </a:rPr>
+              <a:t>[word</a:t>
+            </a:r>
+            <a:r>
+              <a:rPr lang="en-US" sz="800" dirty="0">
+                <a:latin typeface="Courier New" panose="02070309020205020404" pitchFamily="49" charset="0"/>
+                <a:cs typeface="Courier New" panose="02070309020205020404" pitchFamily="49" charset="0"/>
+              </a:rPr>
+              <a:t>] = 1</a:t>
+            </a:r>
+          </a:p>
+          <a:p>
+            <a:r>
+              <a:rPr lang="en-US" sz="800" dirty="0" smtClean="0">
+                <a:latin typeface="Courier New" panose="02070309020205020404" pitchFamily="49" charset="0"/>
+                <a:cs typeface="Courier New" panose="02070309020205020404" pitchFamily="49" charset="0"/>
+              </a:rPr>
+              <a:t>    else</a:t>
+            </a:r>
+            <a:r>
+              <a:rPr lang="en-US" sz="800" dirty="0">
+                <a:latin typeface="Courier New" panose="02070309020205020404" pitchFamily="49" charset="0"/>
+                <a:cs typeface="Courier New" panose="02070309020205020404" pitchFamily="49" charset="0"/>
+              </a:rPr>
+              <a:t>:</a:t>
+            </a:r>
+          </a:p>
+          <a:p>
+            <a:r>
+              <a:rPr lang="en-US" sz="800" dirty="0" smtClean="0">
+                <a:latin typeface="Courier New" panose="02070309020205020404" pitchFamily="49" charset="0"/>
+                <a:cs typeface="Courier New" panose="02070309020205020404" pitchFamily="49" charset="0"/>
+              </a:rPr>
+              <a:t>      </a:t>
+            </a:r>
+            <a:r>
+              <a:rPr lang="en-US" sz="800" dirty="0" err="1" smtClean="0">
+                <a:latin typeface="Courier New" panose="02070309020205020404" pitchFamily="49" charset="0"/>
+                <a:cs typeface="Courier New" panose="02070309020205020404" pitchFamily="49" charset="0"/>
+              </a:rPr>
+              <a:t>self.docHas</a:t>
+            </a:r>
+            <a:r>
+              <a:rPr lang="en-US" sz="800" dirty="0" smtClean="0">
+                <a:latin typeface="Courier New" panose="02070309020205020404" pitchFamily="49" charset="0"/>
+                <a:cs typeface="Courier New" panose="02070309020205020404" pitchFamily="49" charset="0"/>
+              </a:rPr>
+              <a:t>[word</a:t>
+            </a:r>
+            <a:r>
+              <a:rPr lang="en-US" sz="800" dirty="0">
+                <a:latin typeface="Courier New" panose="02070309020205020404" pitchFamily="49" charset="0"/>
+                <a:cs typeface="Courier New" panose="02070309020205020404" pitchFamily="49" charset="0"/>
+              </a:rPr>
+              <a:t>] += </a:t>
+            </a:r>
+            <a:r>
+              <a:rPr lang="en-US" sz="800" dirty="0" smtClean="0">
+                <a:latin typeface="Courier New" panose="02070309020205020404" pitchFamily="49" charset="0"/>
+                <a:cs typeface="Courier New" panose="02070309020205020404" pitchFamily="49" charset="0"/>
+              </a:rPr>
+              <a:t>1</a:t>
+            </a:r>
+            <a:endParaRPr lang="en-US" sz="800" dirty="0">
+              <a:latin typeface="Courier New" panose="02070309020205020404" pitchFamily="49" charset="0"/>
+              <a:cs typeface="Courier New" panose="02070309020205020404" pitchFamily="49" charset="0"/>
+            </a:endParaRPr>
           </a:p>
         </p:txBody>
       </p:sp>
@@ -5355,256 +6378,444 @@
           </a:p>
         </p:txBody>
       </p:sp>
-      <p:sp>
-        <p:nvSpPr>
-          <p:cNvPr id="3" name="Content Placeholder 2"/>
-          <p:cNvSpPr>
-            <a:spLocks noGrp="1"/>
-          </p:cNvSpPr>
-          <p:nvPr>
-            <p:ph idx="1"/>
-          </p:nvPr>
-        </p:nvSpPr>
-        <p:spPr/>
-        <p:txBody>
-          <a:bodyPr>
-            <a:normAutofit/>
-          </a:bodyPr>
-          <a:lstStyle/>
-          <a:p>
-            <a:pPr lvl="1">
-              <a:buFont typeface="Arial"/>
-              <a:buChar char="•"/>
-            </a:pPr>
-            <a:r>
-              <a:rPr lang="en-US" sz="2200" dirty="0" smtClean="0"/>
-              <a:t>Query parsing</a:t>
-            </a:r>
-          </a:p>
-          <a:p>
-            <a:pPr lvl="2">
-              <a:buFont typeface="Arial"/>
-              <a:buChar char="•"/>
-            </a:pPr>
-            <a:r>
-              <a:rPr lang="en-US" sz="2200" dirty="0" smtClean="0"/>
-              <a:t>Recursion </a:t>
-            </a:r>
-          </a:p>
-          <a:p>
-            <a:pPr lvl="1">
-              <a:buFont typeface="Arial"/>
-              <a:buChar char="•"/>
-            </a:pPr>
-            <a:r>
-              <a:rPr lang="en-US" sz="2200" dirty="0" smtClean="0"/>
-              <a:t>Document sorting by rank</a:t>
-            </a:r>
-          </a:p>
-          <a:p>
-            <a:pPr lvl="2">
-              <a:buFont typeface="Arial"/>
-              <a:buChar char="•"/>
-            </a:pPr>
-            <a:r>
-              <a:rPr lang="en-US" sz="2200" dirty="0" smtClean="0"/>
-              <a:t>Python’s </a:t>
-            </a:r>
-            <a:r>
-              <a:rPr lang="en-US" sz="2200" dirty="0" err="1" smtClean="0"/>
-              <a:t>timsort</a:t>
-            </a:r>
-            <a:r>
-              <a:rPr lang="en-US" sz="2200" dirty="0"/>
-              <a:t> - O(n*log(n))</a:t>
-            </a:r>
-            <a:endParaRPr lang="en-US" sz="2200" dirty="0" smtClean="0"/>
-          </a:p>
-          <a:p>
-            <a:pPr lvl="1">
-              <a:buFont typeface="Arial"/>
-              <a:buChar char="•"/>
-            </a:pPr>
-            <a:r>
-              <a:rPr lang="en-US" sz="2200" dirty="0" smtClean="0"/>
-              <a:t>Searching</a:t>
-            </a:r>
-          </a:p>
-          <a:p>
-            <a:pPr lvl="2">
-              <a:buFont typeface="Arial"/>
-              <a:buChar char="•"/>
-            </a:pPr>
-            <a:r>
-              <a:rPr lang="en-US" sz="2200" dirty="0" smtClean="0"/>
-              <a:t>Using dictionary – O(1)</a:t>
-            </a:r>
-          </a:p>
-        </p:txBody>
-      </p:sp>
+      <mc:AlternateContent xmlns:mc="http://schemas.openxmlformats.org/markup-compatibility/2006">
+        <mc:Choice xmlns:a14="http://schemas.microsoft.com/office/drawing/2010/main" Requires="a14">
+          <p:sp>
+            <p:nvSpPr>
+              <p:cNvPr id="3" name="Content Placeholder 2"/>
+              <p:cNvSpPr>
+                <a:spLocks noGrp="1"/>
+              </p:cNvSpPr>
+              <p:nvPr>
+                <p:ph idx="1"/>
+              </p:nvPr>
+            </p:nvSpPr>
+            <p:spPr/>
+            <p:txBody>
+              <a:bodyPr>
+                <a:normAutofit/>
+              </a:bodyPr>
+              <a:lstStyle/>
+              <a:p>
+                <a:pPr lvl="1">
+                  <a:buFont typeface="Arial"/>
+                  <a:buChar char="•"/>
+                </a:pPr>
+                <a:r>
+                  <a:rPr lang="en-US" sz="2200" dirty="0" smtClean="0"/>
+                  <a:t>Document Indexing</a:t>
+                </a:r>
+              </a:p>
+              <a:p>
+                <a:pPr lvl="2">
+                  <a:buFont typeface="Arial"/>
+                  <a:buChar char="•"/>
+                </a:pPr>
+                <a:r>
+                  <a:rPr lang="en-US" sz="2200" dirty="0" smtClean="0"/>
+                  <a:t>Each document is parsed in its entirety </a:t>
+                </a:r>
+                <a14:m>
+                  <m:oMath xmlns:m="http://schemas.openxmlformats.org/officeDocument/2006/math">
+                    <m:r>
+                      <a:rPr lang="en-US" sz="2200" b="0" i="1" smtClean="0">
+                        <a:latin typeface="Cambria Math"/>
+                      </a:rPr>
+                      <m:t>𝑂</m:t>
+                    </m:r>
+                    <m:r>
+                      <a:rPr lang="en-US" sz="2200" b="0" i="1" smtClean="0">
+                        <a:latin typeface="Cambria Math"/>
+                      </a:rPr>
+                      <m:t>(</m:t>
+                    </m:r>
+                    <m:r>
+                      <a:rPr lang="en-US" sz="2200" b="0" i="1" smtClean="0">
+                        <a:latin typeface="Cambria Math"/>
+                      </a:rPr>
+                      <m:t>𝑠</m:t>
+                    </m:r>
+                    <m:r>
+                      <a:rPr lang="en-US" sz="2200" b="0" i="1" smtClean="0">
+                        <a:latin typeface="Cambria Math"/>
+                      </a:rPr>
+                      <m:t>)</m:t>
+                    </m:r>
+                  </m:oMath>
+                </a14:m>
+                <a:endParaRPr lang="en-US" sz="2200" dirty="0" smtClean="0"/>
+              </a:p>
+              <a:p>
+                <a:pPr lvl="1">
+                  <a:buFont typeface="Arial"/>
+                  <a:buChar char="•"/>
+                </a:pPr>
+                <a:r>
+                  <a:rPr lang="en-US" sz="2200" dirty="0" smtClean="0"/>
+                  <a:t>Query </a:t>
+                </a:r>
+                <a:r>
+                  <a:rPr lang="en-US" sz="2200" dirty="0" smtClean="0"/>
+                  <a:t>parsing</a:t>
+                </a:r>
+              </a:p>
+              <a:p>
+                <a:pPr lvl="2">
+                  <a:buFont typeface="Arial"/>
+                  <a:buChar char="•"/>
+                </a:pPr>
+                <a:r>
+                  <a:rPr lang="en-US" sz="2200" dirty="0" smtClean="0"/>
+                  <a:t>Recursion: set operations </a:t>
+                </a:r>
+                <a14:m>
+                  <m:oMath xmlns:m="http://schemas.openxmlformats.org/officeDocument/2006/math">
+                    <m:r>
+                      <a:rPr lang="en-US" sz="2200" b="0" i="1" smtClean="0">
+                        <a:latin typeface="Cambria Math"/>
+                      </a:rPr>
+                      <m:t>𝑂</m:t>
+                    </m:r>
+                    <m:d>
+                      <m:dPr>
+                        <m:ctrlPr>
+                          <a:rPr lang="en-US" sz="2200" b="0" i="1" smtClean="0">
+                            <a:latin typeface="Cambria Math"/>
+                          </a:rPr>
+                        </m:ctrlPr>
+                      </m:dPr>
+                      <m:e>
+                        <m:r>
+                          <a:rPr lang="en-US" sz="2200" b="0" i="1" smtClean="0">
+                            <a:latin typeface="Cambria Math"/>
+                          </a:rPr>
+                          <m:t>𝑄</m:t>
+                        </m:r>
+                        <m:r>
+                          <a:rPr lang="en-US" sz="2200" b="0" i="1" smtClean="0">
+                            <a:latin typeface="Cambria Math"/>
+                            <a:ea typeface="Cambria Math"/>
+                          </a:rPr>
+                          <m:t>∙</m:t>
+                        </m:r>
+                        <m:r>
+                          <a:rPr lang="en-US" sz="2200" b="0" i="1" smtClean="0">
+                            <a:latin typeface="Cambria Math"/>
+                          </a:rPr>
+                          <m:t>𝑊</m:t>
+                        </m:r>
+                        <m:r>
+                          <a:rPr lang="en-US" sz="2200" b="0" i="1" smtClean="0">
+                            <a:latin typeface="Cambria Math"/>
+                            <a:ea typeface="Cambria Math"/>
+                          </a:rPr>
+                          <m:t>∙</m:t>
+                        </m:r>
+                        <m:sSup>
+                          <m:sSupPr>
+                            <m:ctrlPr>
+                              <a:rPr lang="en-US" sz="2200" b="0" i="1" smtClean="0">
+                                <a:latin typeface="Cambria Math"/>
+                              </a:rPr>
+                            </m:ctrlPr>
+                          </m:sSupPr>
+                          <m:e>
+                            <m:r>
+                              <a:rPr lang="en-US" sz="2200" b="0" i="1" smtClean="0">
+                                <a:latin typeface="Cambria Math"/>
+                              </a:rPr>
+                              <m:t>𝐷</m:t>
+                            </m:r>
+                          </m:e>
+                          <m:sup>
+                            <m:r>
+                              <a:rPr lang="en-US" sz="2200" b="0" i="1" smtClean="0">
+                                <a:latin typeface="Cambria Math"/>
+                              </a:rPr>
+                              <m:t>2</m:t>
+                            </m:r>
+                          </m:sup>
+                        </m:sSup>
+                      </m:e>
+                    </m:d>
+                    <m:r>
+                      <a:rPr lang="en-US" sz="2200" b="0" i="1" smtClean="0">
+                        <a:latin typeface="Cambria Math"/>
+                      </a:rPr>
+                      <m:t> </m:t>
+                    </m:r>
+                    <m:r>
+                      <a:rPr lang="en-US" sz="2200" i="1">
+                        <a:latin typeface="Cambria Math"/>
+                        <a:ea typeface="Cambria Math"/>
+                      </a:rPr>
+                      <m:t>≈</m:t>
+                    </m:r>
+                    <m:r>
+                      <a:rPr lang="en-US" sz="2200" i="1">
+                        <a:latin typeface="Cambria Math"/>
+                        <a:ea typeface="Cambria Math"/>
+                      </a:rPr>
+                      <m:t>𝑂</m:t>
+                    </m:r>
+                    <m:r>
+                      <a:rPr lang="en-US" sz="2200" i="1">
+                        <a:latin typeface="Cambria Math"/>
+                        <a:ea typeface="Cambria Math"/>
+                      </a:rPr>
+                      <m:t>(</m:t>
+                    </m:r>
+                    <m:r>
+                      <a:rPr lang="en-US" sz="2200" i="1">
+                        <a:latin typeface="Cambria Math"/>
+                        <a:ea typeface="Cambria Math"/>
+                      </a:rPr>
+                      <m:t>𝑊</m:t>
+                    </m:r>
+                    <m:r>
+                      <a:rPr lang="en-US" sz="2200" i="1">
+                        <a:latin typeface="Cambria Math"/>
+                        <a:ea typeface="Cambria Math"/>
+                      </a:rPr>
+                      <m:t>∙</m:t>
+                    </m:r>
+                    <m:sSup>
+                      <m:sSupPr>
+                        <m:ctrlPr>
+                          <a:rPr lang="en-US" sz="2200" i="1">
+                            <a:latin typeface="Cambria Math"/>
+                          </a:rPr>
+                        </m:ctrlPr>
+                      </m:sSupPr>
+                      <m:e>
+                        <m:r>
+                          <a:rPr lang="en-US" sz="2200" i="1">
+                            <a:latin typeface="Cambria Math"/>
+                          </a:rPr>
+                          <m:t>𝐷</m:t>
+                        </m:r>
+                      </m:e>
+                      <m:sup>
+                        <m:r>
+                          <a:rPr lang="en-US" sz="2200" i="1">
+                            <a:latin typeface="Cambria Math"/>
+                          </a:rPr>
+                          <m:t>2</m:t>
+                        </m:r>
+                      </m:sup>
+                    </m:sSup>
+                  </m:oMath>
+                </a14:m>
+                <a:r>
+                  <a:rPr lang="en-US" sz="2200" b="0" dirty="0" smtClean="0"/>
+                  <a:t>)</a:t>
+                </a:r>
+              </a:p>
+              <a:p>
+                <a:pPr lvl="1">
+                  <a:buFont typeface="Arial"/>
+                  <a:buChar char="•"/>
+                </a:pPr>
+                <a:r>
+                  <a:rPr lang="en-US" sz="2200" dirty="0" smtClean="0"/>
+                  <a:t>Document Ranking</a:t>
+                </a:r>
+                <a:endParaRPr lang="en-US" sz="2200" dirty="0"/>
+              </a:p>
+              <a:p>
+                <a:pPr lvl="2">
+                  <a:buFont typeface="Arial"/>
+                  <a:buChar char="•"/>
+                </a:pPr>
+                <a:r>
+                  <a:rPr lang="en-US" sz="2200" dirty="0"/>
+                  <a:t>Document sorting by rank with Timsort - </a:t>
+                </a:r>
+                <a14:m>
+                  <m:oMath xmlns:m="http://schemas.openxmlformats.org/officeDocument/2006/math">
+                    <m:r>
+                      <a:rPr lang="en-US" sz="2200" i="1">
+                        <a:latin typeface="Cambria Math"/>
+                      </a:rPr>
+                      <m:t>𝑂</m:t>
+                    </m:r>
+                    <m:r>
+                      <a:rPr lang="en-US" sz="2200" i="1">
+                        <a:latin typeface="Cambria Math"/>
+                      </a:rPr>
+                      <m:t>(</m:t>
+                    </m:r>
+                    <m:r>
+                      <a:rPr lang="en-US" sz="2200" i="1">
+                        <a:latin typeface="Cambria Math"/>
+                      </a:rPr>
+                      <m:t>𝑛</m:t>
+                    </m:r>
+                    <m:r>
+                      <a:rPr lang="en-US" sz="2200" i="1">
+                        <a:latin typeface="Cambria Math"/>
+                        <a:ea typeface="Cambria Math"/>
+                      </a:rPr>
+                      <m:t>∙</m:t>
+                    </m:r>
+                    <m:func>
+                      <m:funcPr>
+                        <m:ctrlPr>
+                          <a:rPr lang="en-US" sz="2200" i="1">
+                            <a:latin typeface="Cambria Math"/>
+                            <a:ea typeface="Cambria Math"/>
+                          </a:rPr>
+                        </m:ctrlPr>
+                      </m:funcPr>
+                      <m:fName>
+                        <m:r>
+                          <m:rPr>
+                            <m:sty m:val="p"/>
+                          </m:rPr>
+                          <a:rPr lang="en-US" sz="2200">
+                            <a:latin typeface="Cambria Math"/>
+                            <a:ea typeface="Cambria Math"/>
+                          </a:rPr>
+                          <m:t>log</m:t>
+                        </m:r>
+                      </m:fName>
+                      <m:e>
+                        <m:d>
+                          <m:dPr>
+                            <m:ctrlPr>
+                              <a:rPr lang="en-US" sz="2200" i="1">
+                                <a:latin typeface="Cambria Math"/>
+                                <a:ea typeface="Cambria Math"/>
+                              </a:rPr>
+                            </m:ctrlPr>
+                          </m:dPr>
+                          <m:e>
+                            <m:r>
+                              <a:rPr lang="en-US" sz="2200" i="1">
+                                <a:latin typeface="Cambria Math"/>
+                                <a:ea typeface="Cambria Math"/>
+                              </a:rPr>
+                              <m:t>𝑛</m:t>
+                            </m:r>
+                          </m:e>
+                        </m:d>
+                      </m:e>
+                    </m:func>
+                    <m:r>
+                      <a:rPr lang="en-US" sz="2200" i="1">
+                        <a:latin typeface="Cambria Math"/>
+                        <a:ea typeface="Cambria Math"/>
+                      </a:rPr>
+                      <m:t>)</m:t>
+                    </m:r>
+                  </m:oMath>
+                </a14:m>
+                <a:endParaRPr lang="en-US" sz="2200" dirty="0" smtClean="0"/>
+              </a:p>
+              <a:p>
+                <a:pPr lvl="2">
+                  <a:buFont typeface="Arial"/>
+                  <a:buChar char="•"/>
+                </a:pPr>
+                <a:r>
+                  <a:rPr lang="en-US" sz="2200" dirty="0" smtClean="0"/>
+                  <a:t>Two factors, each observed from hash tables </a:t>
+                </a:r>
+                <a:r>
+                  <a:rPr lang="en-US" sz="2200" dirty="0" smtClean="0"/>
+                  <a:t>– </a:t>
+                </a:r>
+                <a14:m>
+                  <m:oMath xmlns:m="http://schemas.openxmlformats.org/officeDocument/2006/math">
+                    <m:r>
+                      <a:rPr lang="en-US" sz="2200" b="0" i="1" smtClean="0">
+                        <a:latin typeface="Cambria Math"/>
+                      </a:rPr>
+                      <m:t>𝑂</m:t>
+                    </m:r>
+                    <m:d>
+                      <m:dPr>
+                        <m:ctrlPr>
+                          <a:rPr lang="en-US" sz="2200" b="0" i="1" smtClean="0">
+                            <a:latin typeface="Cambria Math"/>
+                          </a:rPr>
+                        </m:ctrlPr>
+                      </m:dPr>
+                      <m:e>
+                        <m:r>
+                          <a:rPr lang="en-US" sz="2200" b="0" i="1" smtClean="0">
+                            <a:latin typeface="Cambria Math"/>
+                          </a:rPr>
+                          <m:t>1</m:t>
+                        </m:r>
+                      </m:e>
+                    </m:d>
+                  </m:oMath>
+                </a14:m>
+                <a:endParaRPr lang="en-US" sz="2200" b="0" dirty="0" smtClean="0"/>
+              </a:p>
+              <a:p>
+                <a:pPr lvl="3">
+                  <a:buFont typeface="Arial"/>
+                  <a:buChar char="•"/>
+                </a:pPr>
+                <a:r>
+                  <a:rPr lang="en-US" sz="2200" dirty="0" smtClean="0"/>
+                  <a:t>Word Frequency</a:t>
+                </a:r>
+              </a:p>
+              <a:p>
+                <a:pPr lvl="3">
+                  <a:buFont typeface="Arial"/>
+                  <a:buChar char="•"/>
+                </a:pPr>
+                <a:r>
+                  <a:rPr lang="en-US" sz="2200" dirty="0" smtClean="0"/>
+                  <a:t>Document Frequency</a:t>
+                </a:r>
+                <a:endParaRPr lang="en-US" sz="2200" dirty="0" smtClean="0"/>
+              </a:p>
+            </p:txBody>
+          </p:sp>
+        </mc:Choice>
+        <mc:Fallback>
+          <p:sp>
+            <p:nvSpPr>
+              <p:cNvPr id="3" name="Content Placeholder 2"/>
+              <p:cNvSpPr>
+                <a:spLocks noGrp="1" noRot="1" noChangeAspect="1" noMove="1" noResize="1" noEditPoints="1" noAdjustHandles="1" noChangeArrowheads="1" noChangeShapeType="1" noTextEdit="1"/>
+              </p:cNvSpPr>
+              <p:nvPr>
+                <p:ph idx="1"/>
+              </p:nvPr>
+            </p:nvSpPr>
+            <p:spPr>
+              <a:blipFill rotWithShape="1">
+                <a:blip r:embed="rId2"/>
+                <a:stretch>
+                  <a:fillRect l="-891" t="-852"/>
+                </a:stretch>
+              </a:blipFill>
+            </p:spPr>
+            <p:txBody>
+              <a:bodyPr/>
+              <a:lstStyle/>
+              <a:p>
+                <a:r>
+                  <a:rPr lang="en-US">
+                    <a:noFill/>
+                  </a:rPr>
+                  <a:t> </a:t>
+                </a:r>
+              </a:p>
+            </p:txBody>
+          </p:sp>
+        </mc:Fallback>
+      </mc:AlternateContent>
     </p:spTree>
     <p:extLst>
       <p:ext uri="{BB962C8B-B14F-4D97-AF65-F5344CB8AC3E}">
         <p14:creationId xmlns:p14="http://schemas.microsoft.com/office/powerpoint/2010/main" val="604328647"/>
-      </p:ext>
-    </p:extLst>
-  </p:cSld>
-  <p:clrMapOvr>
-    <a:masterClrMapping/>
-  </p:clrMapOvr>
-</p:sld>
-</file>
-
-<file path=ppt/slides/slide5.xml><?xml version="1.0" encoding="utf-8"?>
-<p:sld xmlns:a="http://schemas.openxmlformats.org/drawingml/2006/main" xmlns:r="http://schemas.openxmlformats.org/officeDocument/2006/relationships" xmlns:p="http://schemas.openxmlformats.org/presentationml/2006/main">
-  <p:cSld>
-    <p:spTree>
-      <p:nvGrpSpPr>
-        <p:cNvPr id="1" name=""/>
-        <p:cNvGrpSpPr/>
-        <p:nvPr/>
-      </p:nvGrpSpPr>
-      <p:grpSpPr>
-        <a:xfrm>
-          <a:off x="0" y="0"/>
-          <a:ext cx="0" cy="0"/>
-          <a:chOff x="0" y="0"/>
-          <a:chExt cx="0" cy="0"/>
-        </a:xfrm>
-      </p:grpSpPr>
-      <p:sp>
-        <p:nvSpPr>
-          <p:cNvPr id="2" name="Title 1"/>
-          <p:cNvSpPr>
-            <a:spLocks noGrp="1"/>
-          </p:cNvSpPr>
-          <p:nvPr>
-            <p:ph type="title"/>
-          </p:nvPr>
-        </p:nvSpPr>
-        <p:spPr/>
-        <p:txBody>
-          <a:bodyPr/>
-          <a:lstStyle/>
-          <a:p>
-            <a:r>
-              <a:rPr lang="en-US" dirty="0" smtClean="0"/>
-              <a:t>Running time</a:t>
-            </a:r>
-            <a:endParaRPr lang="en-US" dirty="0"/>
-          </a:p>
-        </p:txBody>
-      </p:sp>
-      <p:sp>
-        <p:nvSpPr>
-          <p:cNvPr id="4" name="Content Placeholder 2"/>
-          <p:cNvSpPr>
-            <a:spLocks noGrp="1"/>
-          </p:cNvSpPr>
-          <p:nvPr>
-            <p:ph idx="1"/>
-          </p:nvPr>
-        </p:nvSpPr>
-        <p:spPr>
-          <a:xfrm>
-            <a:off x="822960" y="1100628"/>
-            <a:ext cx="7520940" cy="3579849"/>
-          </a:xfrm>
-        </p:spPr>
-        <p:txBody>
-          <a:bodyPr>
-            <a:normAutofit lnSpcReduction="10000"/>
-          </a:bodyPr>
-          <a:lstStyle/>
-          <a:p>
-            <a:pPr lvl="1">
-              <a:buFont typeface="Arial"/>
-              <a:buChar char="•"/>
-            </a:pPr>
-            <a:r>
-              <a:rPr lang="en-US" sz="2200" dirty="0" smtClean="0"/>
-              <a:t>Indexing documents</a:t>
-            </a:r>
-          </a:p>
-          <a:p>
-            <a:pPr lvl="2">
-              <a:buFont typeface="Arial"/>
-              <a:buChar char="•"/>
-            </a:pPr>
-            <a:r>
-              <a:rPr lang="en-US" sz="2200" dirty="0" smtClean="0"/>
-              <a:t>Adds the words in each document (minus stop words) to a dictionary</a:t>
-            </a:r>
-          </a:p>
-          <a:p>
-            <a:pPr lvl="2">
-              <a:buFont typeface="Arial"/>
-              <a:buChar char="•"/>
-            </a:pPr>
-            <a:r>
-              <a:rPr lang="en-US" sz="2200" dirty="0" smtClean="0"/>
-              <a:t>Adds the documents to a global dictionary based on the words they contain</a:t>
-            </a:r>
-          </a:p>
-          <a:p>
-            <a:pPr lvl="2">
-              <a:buFont typeface="Arial"/>
-              <a:buChar char="•"/>
-            </a:pPr>
-            <a:r>
-              <a:rPr lang="en-US" sz="2200" dirty="0" smtClean="0"/>
-              <a:t>O(n) </a:t>
-            </a:r>
-            <a:r>
-              <a:rPr lang="en-US" sz="2200" dirty="0" smtClean="0">
-                <a:sym typeface="Wingdings"/>
-              </a:rPr>
-              <a:t> dependent on the number of words in the docs and the number of docs</a:t>
-            </a:r>
-          </a:p>
-          <a:p>
-            <a:pPr lvl="1">
-              <a:buFont typeface="Arial"/>
-              <a:buChar char="•"/>
-            </a:pPr>
-            <a:r>
-              <a:rPr lang="en-US" sz="2200" dirty="0" smtClean="0">
-                <a:sym typeface="Wingdings"/>
-              </a:rPr>
-              <a:t>Parsing queries</a:t>
-            </a:r>
-          </a:p>
-          <a:p>
-            <a:pPr lvl="2">
-              <a:buFont typeface="Arial"/>
-              <a:buChar char="•"/>
-            </a:pPr>
-            <a:r>
-              <a:rPr lang="en-US" sz="2200" dirty="0" smtClean="0">
-                <a:sym typeface="Wingdings"/>
-              </a:rPr>
-              <a:t>Recursive</a:t>
-            </a:r>
-          </a:p>
-          <a:p>
-            <a:pPr lvl="2">
-              <a:buFont typeface="Arial"/>
-              <a:buChar char="•"/>
-            </a:pPr>
-            <a:r>
-              <a:rPr lang="en-US" sz="2200" dirty="0" smtClean="0">
-                <a:sym typeface="Wingdings"/>
-              </a:rPr>
-              <a:t>O(2^n)  dependent on the number of words in the query</a:t>
-            </a:r>
-            <a:endParaRPr lang="en-US" sz="2200" dirty="0" smtClean="0"/>
-          </a:p>
-        </p:txBody>
-      </p:sp>
-    </p:spTree>
-    <p:extLst>
-      <p:ext uri="{BB962C8B-B14F-4D97-AF65-F5344CB8AC3E}">
-        <p14:creationId xmlns:p14="http://schemas.microsoft.com/office/powerpoint/2010/main" val="778592055"/>
       </p:ext>
     </p:extLst>
   </p:cSld>

</xml_diff>

<commit_message>
Not sure of changes from previous commit
</commit_message>
<xml_diff>
--- a/presentation/LiaBogoev_JohnCall.pptx
+++ b/presentation/LiaBogoev_JohnCall.pptx
@@ -9,6 +9,7 @@
     <p:sldId id="257" r:id="rId3"/>
     <p:sldId id="258" r:id="rId4"/>
     <p:sldId id="259" r:id="rId5"/>
+    <p:sldId id="260" r:id="rId6"/>
   </p:sldIdLst>
   <p:sldSz cx="9144000" cy="6858000" type="screen4x3"/>
   <p:notesSz cx="6858000" cy="9144000"/>
@@ -4864,6 +4865,13 @@
   <p:clrMapOvr>
     <a:masterClrMapping/>
   </p:clrMapOvr>
+  <p:timing>
+    <p:tnLst>
+      <p:par>
+        <p:cTn id="1" dur="indefinite" restart="never" nodeType="tmRoot"/>
+      </p:par>
+    </p:tnLst>
+  </p:timing>
 </p:sld>
 </file>
 
@@ -5048,6 +5056,13 @@
   <p:clrMapOvr>
     <a:masterClrMapping/>
   </p:clrMapOvr>
+  <p:timing>
+    <p:tnLst>
+      <p:par>
+        <p:cTn id="1" dur="indefinite" restart="never" nodeType="tmRoot"/>
+      </p:par>
+    </p:tnLst>
+  </p:timing>
 </p:sld>
 </file>
 
@@ -5313,7 +5328,7 @@
                   <a:t>Python’s list </a:t>
                 </a:r>
                 <a:r>
-                  <a:rPr lang="en-US" sz="2200" smtClean="0"/>
+                  <a:rPr lang="en-US" sz="2200" dirty="0" smtClean="0"/>
                   <a:t>≡ array</a:t>
                 </a:r>
                 <a:endParaRPr lang="en-US" sz="2200" dirty="0" smtClean="0"/>
@@ -5425,906 +5440,47 @@
           </p:sp>
         </mc:Fallback>
       </mc:AlternateContent>
-      <p:sp>
-        <p:nvSpPr>
-          <p:cNvPr id="5" name="TextBox 4"/>
-          <p:cNvSpPr txBox="1"/>
+      <p:pic>
+        <p:nvPicPr>
+          <p:cNvPr id="1027" name="Picture 3" descr="C:\Users\John\Desktop\Final Projects\presentation\code shots\transparent_1.png"/>
+          <p:cNvPicPr>
+            <a:picLocks noChangeAspect="1" noChangeArrowheads="1"/>
+          </p:cNvPicPr>
           <p:nvPr/>
-        </p:nvSpPr>
-        <p:spPr>
+        </p:nvPicPr>
+        <p:blipFill>
+          <a:blip r:embed="rId3" cstate="email">
+            <a:extLst>
+              <a:ext uri="{28A0092B-C50C-407E-A947-70E740481C1C}">
+                <a14:useLocalDpi xmlns:a14="http://schemas.microsoft.com/office/drawing/2010/main" val="0"/>
+              </a:ext>
+            </a:extLst>
+          </a:blip>
+          <a:srcRect/>
+          <a:stretch>
+            <a:fillRect/>
+          </a:stretch>
+        </p:blipFill>
+        <p:spPr bwMode="auto">
           <a:xfrm>
-            <a:off x="4455632" y="1349463"/>
-            <a:ext cx="4631396" cy="3662541"/>
+            <a:off x="4338918" y="234385"/>
+            <a:ext cx="4004982" cy="4699370"/>
           </a:xfrm>
           <a:prstGeom prst="rect">
             <a:avLst/>
           </a:prstGeom>
           <a:noFill/>
+          <a:extLst>
+            <a:ext uri="{909E8E84-426E-40DD-AFC4-6F175D3DCCD1}">
+              <a14:hiddenFill xmlns:a14="http://schemas.microsoft.com/office/drawing/2010/main">
+                <a:solidFill>
+                  <a:srgbClr val="FFFFFF"/>
+                </a:solidFill>
+              </a14:hiddenFill>
+            </a:ext>
+          </a:extLst>
         </p:spPr>
-        <p:txBody>
-          <a:bodyPr wrap="none" rtlCol="0">
-            <a:spAutoFit/>
-          </a:bodyPr>
-          <a:lstStyle/>
-          <a:p>
-            <a:r>
-              <a:rPr lang="en-US" sz="800" dirty="0" smtClean="0">
-                <a:latin typeface="Courier New" panose="02070309020205020404" pitchFamily="49" charset="0"/>
-                <a:cs typeface="Courier New" panose="02070309020205020404" pitchFamily="49" charset="0"/>
-              </a:rPr>
-              <a:t>class </a:t>
-            </a:r>
-            <a:r>
-              <a:rPr lang="en-US" sz="800" dirty="0">
-                <a:latin typeface="Courier New" panose="02070309020205020404" pitchFamily="49" charset="0"/>
-                <a:cs typeface="Courier New" panose="02070309020205020404" pitchFamily="49" charset="0"/>
-              </a:rPr>
-              <a:t>DOC:</a:t>
-            </a:r>
-          </a:p>
-          <a:p>
-            <a:r>
-              <a:rPr lang="en-US" sz="800" dirty="0" smtClean="0">
-                <a:latin typeface="Courier New" panose="02070309020205020404" pitchFamily="49" charset="0"/>
-                <a:cs typeface="Courier New" panose="02070309020205020404" pitchFamily="49" charset="0"/>
-              </a:rPr>
-              <a:t>  # </a:t>
-            </a:r>
-            <a:r>
-              <a:rPr lang="en-US" sz="800" dirty="0">
-                <a:latin typeface="Courier New" panose="02070309020205020404" pitchFamily="49" charset="0"/>
-                <a:cs typeface="Courier New" panose="02070309020205020404" pitchFamily="49" charset="0"/>
-              </a:rPr>
-              <a:t>document frequency statically referenced</a:t>
-            </a:r>
-          </a:p>
-          <a:p>
-            <a:r>
-              <a:rPr lang="en-US" sz="800" dirty="0" smtClean="0">
-                <a:latin typeface="Courier New" panose="02070309020205020404" pitchFamily="49" charset="0"/>
-                <a:cs typeface="Courier New" panose="02070309020205020404" pitchFamily="49" charset="0"/>
-              </a:rPr>
-              <a:t>  # </a:t>
-            </a:r>
-            <a:r>
-              <a:rPr lang="en-US" sz="800" dirty="0">
-                <a:latin typeface="Courier New" panose="02070309020205020404" pitchFamily="49" charset="0"/>
-                <a:cs typeface="Courier New" panose="02070309020205020404" pitchFamily="49" charset="0"/>
-              </a:rPr>
-              <a:t>each key maps to an array of DOC references that have that key</a:t>
-            </a:r>
-          </a:p>
-          <a:p>
-            <a:r>
-              <a:rPr lang="en-US" sz="800" dirty="0">
-                <a:latin typeface="Courier New" panose="02070309020205020404" pitchFamily="49" charset="0"/>
-                <a:cs typeface="Courier New" panose="02070309020205020404" pitchFamily="49" charset="0"/>
-              </a:rPr>
-              <a:t> </a:t>
-            </a:r>
-            <a:r>
-              <a:rPr lang="en-US" sz="800" dirty="0" smtClean="0">
-                <a:latin typeface="Courier New" panose="02070309020205020404" pitchFamily="49" charset="0"/>
-                <a:cs typeface="Courier New" panose="02070309020205020404" pitchFamily="49" charset="0"/>
-              </a:rPr>
-              <a:t> </a:t>
-            </a:r>
-            <a:r>
-              <a:rPr lang="en-US" sz="800" dirty="0" err="1" smtClean="0">
-                <a:latin typeface="Courier New" panose="02070309020205020404" pitchFamily="49" charset="0"/>
-                <a:cs typeface="Courier New" panose="02070309020205020404" pitchFamily="49" charset="0"/>
-              </a:rPr>
-              <a:t>docsHave</a:t>
-            </a:r>
-            <a:r>
-              <a:rPr lang="en-US" sz="800" dirty="0" smtClean="0">
-                <a:latin typeface="Courier New" panose="02070309020205020404" pitchFamily="49" charset="0"/>
-                <a:cs typeface="Courier New" panose="02070309020205020404" pitchFamily="49" charset="0"/>
-              </a:rPr>
-              <a:t> </a:t>
-            </a:r>
-            <a:r>
-              <a:rPr lang="en-US" sz="800" dirty="0">
-                <a:latin typeface="Courier New" panose="02070309020205020404" pitchFamily="49" charset="0"/>
-                <a:cs typeface="Courier New" panose="02070309020205020404" pitchFamily="49" charset="0"/>
-              </a:rPr>
-              <a:t>= </a:t>
-            </a:r>
-            <a:r>
-              <a:rPr lang="en-US" sz="800" dirty="0" err="1">
-                <a:latin typeface="Courier New" panose="02070309020205020404" pitchFamily="49" charset="0"/>
-                <a:cs typeface="Courier New" panose="02070309020205020404" pitchFamily="49" charset="0"/>
-              </a:rPr>
-              <a:t>dict</a:t>
-            </a:r>
-            <a:r>
-              <a:rPr lang="en-US" sz="800" dirty="0" smtClean="0">
-                <a:latin typeface="Courier New" panose="02070309020205020404" pitchFamily="49" charset="0"/>
-                <a:cs typeface="Courier New" panose="02070309020205020404" pitchFamily="49" charset="0"/>
-              </a:rPr>
-              <a:t>()</a:t>
-            </a:r>
-            <a:r>
-              <a:rPr lang="en-US" sz="800" dirty="0">
-                <a:latin typeface="Courier New" panose="02070309020205020404" pitchFamily="49" charset="0"/>
-                <a:cs typeface="Courier New" panose="02070309020205020404" pitchFamily="49" charset="0"/>
-              </a:rPr>
-              <a:t/>
-            </a:r>
-            <a:br>
-              <a:rPr lang="en-US" sz="800" dirty="0">
-                <a:latin typeface="Courier New" panose="02070309020205020404" pitchFamily="49" charset="0"/>
-                <a:cs typeface="Courier New" panose="02070309020205020404" pitchFamily="49" charset="0"/>
-              </a:rPr>
-            </a:br>
-            <a:endParaRPr lang="en-US" sz="800" dirty="0">
-              <a:latin typeface="Courier New" panose="02070309020205020404" pitchFamily="49" charset="0"/>
-              <a:cs typeface="Courier New" panose="02070309020205020404" pitchFamily="49" charset="0"/>
-            </a:endParaRPr>
-          </a:p>
-          <a:p>
-            <a:r>
-              <a:rPr lang="en-US" sz="800" dirty="0" smtClean="0">
-                <a:latin typeface="Courier New" panose="02070309020205020404" pitchFamily="49" charset="0"/>
-                <a:cs typeface="Courier New" panose="02070309020205020404" pitchFamily="49" charset="0"/>
-              </a:rPr>
-              <a:t>  </a:t>
-            </a:r>
-            <a:r>
-              <a:rPr lang="en-US" sz="800" dirty="0" err="1" smtClean="0">
-                <a:latin typeface="Courier New" panose="02070309020205020404" pitchFamily="49" charset="0"/>
-                <a:cs typeface="Courier New" panose="02070309020205020404" pitchFamily="49" charset="0"/>
-              </a:rPr>
-              <a:t>def</a:t>
-            </a:r>
-            <a:r>
-              <a:rPr lang="en-US" sz="800" dirty="0" smtClean="0">
-                <a:latin typeface="Courier New" panose="02070309020205020404" pitchFamily="49" charset="0"/>
-                <a:cs typeface="Courier New" panose="02070309020205020404" pitchFamily="49" charset="0"/>
-              </a:rPr>
-              <a:t> </a:t>
-            </a:r>
-            <a:r>
-              <a:rPr lang="en-US" sz="800" dirty="0">
-                <a:latin typeface="Courier New" panose="02070309020205020404" pitchFamily="49" charset="0"/>
-                <a:cs typeface="Courier New" panose="02070309020205020404" pitchFamily="49" charset="0"/>
-              </a:rPr>
-              <a:t>__</a:t>
-            </a:r>
-            <a:r>
-              <a:rPr lang="en-US" sz="800" dirty="0" err="1">
-                <a:latin typeface="Courier New" panose="02070309020205020404" pitchFamily="49" charset="0"/>
-                <a:cs typeface="Courier New" panose="02070309020205020404" pitchFamily="49" charset="0"/>
-              </a:rPr>
-              <a:t>init</a:t>
-            </a:r>
-            <a:r>
-              <a:rPr lang="en-US" sz="800" dirty="0">
-                <a:latin typeface="Courier New" panose="02070309020205020404" pitchFamily="49" charset="0"/>
-                <a:cs typeface="Courier New" panose="02070309020205020404" pitchFamily="49" charset="0"/>
-              </a:rPr>
-              <a:t>__(self, file):</a:t>
-            </a:r>
-          </a:p>
-          <a:p>
-            <a:r>
-              <a:rPr lang="en-US" sz="800" dirty="0" smtClean="0">
-                <a:latin typeface="Courier New" panose="02070309020205020404" pitchFamily="49" charset="0"/>
-                <a:cs typeface="Courier New" panose="02070309020205020404" pitchFamily="49" charset="0"/>
-              </a:rPr>
-              <a:t>    # </a:t>
-            </a:r>
-            <a:r>
-              <a:rPr lang="en-US" sz="800" dirty="0">
-                <a:latin typeface="Courier New" panose="02070309020205020404" pitchFamily="49" charset="0"/>
-                <a:cs typeface="Courier New" panose="02070309020205020404" pitchFamily="49" charset="0"/>
-              </a:rPr>
-              <a:t>prep the xml parser</a:t>
-            </a:r>
-          </a:p>
-          <a:p>
-            <a:r>
-              <a:rPr lang="en-US" sz="800" dirty="0" smtClean="0">
-                <a:latin typeface="Courier New" panose="02070309020205020404" pitchFamily="49" charset="0"/>
-                <a:cs typeface="Courier New" panose="02070309020205020404" pitchFamily="49" charset="0"/>
-              </a:rPr>
-              <a:t>    doc </a:t>
-            </a:r>
-            <a:r>
-              <a:rPr lang="en-US" sz="800" dirty="0">
-                <a:latin typeface="Courier New" panose="02070309020205020404" pitchFamily="49" charset="0"/>
-                <a:cs typeface="Courier New" panose="02070309020205020404" pitchFamily="49" charset="0"/>
-              </a:rPr>
-              <a:t>= </a:t>
-            </a:r>
-            <a:r>
-              <a:rPr lang="en-US" sz="800" dirty="0" err="1">
-                <a:latin typeface="Courier New" panose="02070309020205020404" pitchFamily="49" charset="0"/>
-                <a:cs typeface="Courier New" panose="02070309020205020404" pitchFamily="49" charset="0"/>
-              </a:rPr>
-              <a:t>xml.parse</a:t>
-            </a:r>
-            <a:r>
-              <a:rPr lang="en-US" sz="800" dirty="0">
-                <a:latin typeface="Courier New" panose="02070309020205020404" pitchFamily="49" charset="0"/>
-                <a:cs typeface="Courier New" panose="02070309020205020404" pitchFamily="49" charset="0"/>
-              </a:rPr>
-              <a:t>("documents/" + file).</a:t>
-            </a:r>
-            <a:r>
-              <a:rPr lang="en-US" sz="800" dirty="0" err="1">
-                <a:latin typeface="Courier New" panose="02070309020205020404" pitchFamily="49" charset="0"/>
-                <a:cs typeface="Courier New" panose="02070309020205020404" pitchFamily="49" charset="0"/>
-              </a:rPr>
-              <a:t>getroot</a:t>
-            </a:r>
-            <a:r>
-              <a:rPr lang="en-US" sz="800" dirty="0">
-                <a:latin typeface="Courier New" panose="02070309020205020404" pitchFamily="49" charset="0"/>
-                <a:cs typeface="Courier New" panose="02070309020205020404" pitchFamily="49" charset="0"/>
-              </a:rPr>
-              <a:t>()</a:t>
-            </a:r>
-          </a:p>
-          <a:p>
-            <a:endParaRPr lang="en-US" sz="800" dirty="0" smtClean="0">
-              <a:latin typeface="Courier New" panose="02070309020205020404" pitchFamily="49" charset="0"/>
-              <a:cs typeface="Courier New" panose="02070309020205020404" pitchFamily="49" charset="0"/>
-            </a:endParaRPr>
-          </a:p>
-          <a:p>
-            <a:r>
-              <a:rPr lang="en-US" sz="800" dirty="0">
-                <a:latin typeface="Courier New" panose="02070309020205020404" pitchFamily="49" charset="0"/>
-                <a:cs typeface="Courier New" panose="02070309020205020404" pitchFamily="49" charset="0"/>
-              </a:rPr>
-              <a:t> </a:t>
-            </a:r>
-            <a:r>
-              <a:rPr lang="en-US" sz="800" dirty="0" smtClean="0">
-                <a:latin typeface="Courier New" panose="02070309020205020404" pitchFamily="49" charset="0"/>
-                <a:cs typeface="Courier New" panose="02070309020205020404" pitchFamily="49" charset="0"/>
-              </a:rPr>
-              <a:t>   # </a:t>
-            </a:r>
-            <a:r>
-              <a:rPr lang="en-US" sz="800" dirty="0">
-                <a:latin typeface="Courier New" panose="02070309020205020404" pitchFamily="49" charset="0"/>
-                <a:cs typeface="Courier New" panose="02070309020205020404" pitchFamily="49" charset="0"/>
-              </a:rPr>
-              <a:t>index words in document</a:t>
-            </a:r>
-          </a:p>
-          <a:p>
-            <a:r>
-              <a:rPr lang="en-US" sz="800" dirty="0" smtClean="0">
-                <a:latin typeface="Courier New" panose="02070309020205020404" pitchFamily="49" charset="0"/>
-                <a:cs typeface="Courier New" panose="02070309020205020404" pitchFamily="49" charset="0"/>
-              </a:rPr>
-              <a:t>    </a:t>
-            </a:r>
-            <a:r>
-              <a:rPr lang="en-US" sz="800" dirty="0" err="1" smtClean="0">
-                <a:latin typeface="Courier New" panose="02070309020205020404" pitchFamily="49" charset="0"/>
-                <a:cs typeface="Courier New" panose="02070309020205020404" pitchFamily="49" charset="0"/>
-              </a:rPr>
-              <a:t>self.docHas</a:t>
-            </a:r>
-            <a:r>
-              <a:rPr lang="en-US" sz="800" dirty="0" smtClean="0">
-                <a:latin typeface="Courier New" panose="02070309020205020404" pitchFamily="49" charset="0"/>
-                <a:cs typeface="Courier New" panose="02070309020205020404" pitchFamily="49" charset="0"/>
-              </a:rPr>
-              <a:t> </a:t>
-            </a:r>
-            <a:r>
-              <a:rPr lang="en-US" sz="800" dirty="0">
-                <a:latin typeface="Courier New" panose="02070309020205020404" pitchFamily="49" charset="0"/>
-                <a:cs typeface="Courier New" panose="02070309020205020404" pitchFamily="49" charset="0"/>
-              </a:rPr>
-              <a:t>= </a:t>
-            </a:r>
-            <a:r>
-              <a:rPr lang="en-US" sz="800" dirty="0" err="1">
-                <a:latin typeface="Courier New" panose="02070309020205020404" pitchFamily="49" charset="0"/>
-                <a:cs typeface="Courier New" panose="02070309020205020404" pitchFamily="49" charset="0"/>
-              </a:rPr>
-              <a:t>dict</a:t>
-            </a:r>
-            <a:r>
-              <a:rPr lang="en-US" sz="800" dirty="0">
-                <a:latin typeface="Courier New" panose="02070309020205020404" pitchFamily="49" charset="0"/>
-                <a:cs typeface="Courier New" panose="02070309020205020404" pitchFamily="49" charset="0"/>
-              </a:rPr>
-              <a:t>()</a:t>
-            </a:r>
-          </a:p>
-          <a:p>
-            <a:r>
-              <a:rPr lang="en-US" sz="800" dirty="0" smtClean="0">
-                <a:latin typeface="Courier New" panose="02070309020205020404" pitchFamily="49" charset="0"/>
-                <a:cs typeface="Courier New" panose="02070309020205020404" pitchFamily="49" charset="0"/>
-              </a:rPr>
-              <a:t>    </a:t>
-            </a:r>
-            <a:r>
-              <a:rPr lang="en-US" sz="800" dirty="0" err="1" smtClean="0">
-                <a:latin typeface="Courier New" panose="02070309020205020404" pitchFamily="49" charset="0"/>
-                <a:cs typeface="Courier New" panose="02070309020205020404" pitchFamily="49" charset="0"/>
-              </a:rPr>
-              <a:t>self</a:t>
-            </a:r>
-            <a:r>
-              <a:rPr lang="en-US" sz="800" dirty="0" err="1">
-                <a:latin typeface="Courier New" panose="02070309020205020404" pitchFamily="49" charset="0"/>
-                <a:cs typeface="Courier New" panose="02070309020205020404" pitchFamily="49" charset="0"/>
-              </a:rPr>
-              <a:t>.__index</a:t>
-            </a:r>
-            <a:r>
-              <a:rPr lang="en-US" sz="800" dirty="0">
-                <a:latin typeface="Courier New" panose="02070309020205020404" pitchFamily="49" charset="0"/>
-                <a:cs typeface="Courier New" panose="02070309020205020404" pitchFamily="49" charset="0"/>
-              </a:rPr>
-              <a:t>(</a:t>
-            </a:r>
-            <a:r>
-              <a:rPr lang="en-US" sz="800" dirty="0" err="1">
-                <a:latin typeface="Courier New" panose="02070309020205020404" pitchFamily="49" charset="0"/>
-                <a:cs typeface="Courier New" panose="02070309020205020404" pitchFamily="49" charset="0"/>
-              </a:rPr>
-              <a:t>self.title</a:t>
-            </a:r>
-            <a:r>
-              <a:rPr lang="en-US" sz="800" dirty="0">
-                <a:latin typeface="Courier New" panose="02070309020205020404" pitchFamily="49" charset="0"/>
-                <a:cs typeface="Courier New" panose="02070309020205020404" pitchFamily="49" charset="0"/>
-              </a:rPr>
-              <a:t>)</a:t>
-            </a:r>
-          </a:p>
-          <a:p>
-            <a:r>
-              <a:rPr lang="en-US" sz="800" dirty="0" smtClean="0">
-                <a:latin typeface="Courier New" panose="02070309020205020404" pitchFamily="49" charset="0"/>
-                <a:cs typeface="Courier New" panose="02070309020205020404" pitchFamily="49" charset="0"/>
-              </a:rPr>
-              <a:t>    </a:t>
-            </a:r>
-            <a:r>
-              <a:rPr lang="en-US" sz="800" dirty="0" err="1" smtClean="0">
-                <a:latin typeface="Courier New" panose="02070309020205020404" pitchFamily="49" charset="0"/>
-                <a:cs typeface="Courier New" panose="02070309020205020404" pitchFamily="49" charset="0"/>
-              </a:rPr>
-              <a:t>self</a:t>
-            </a:r>
-            <a:r>
-              <a:rPr lang="en-US" sz="800" dirty="0" err="1">
-                <a:latin typeface="Courier New" panose="02070309020205020404" pitchFamily="49" charset="0"/>
-                <a:cs typeface="Courier New" panose="02070309020205020404" pitchFamily="49" charset="0"/>
-              </a:rPr>
-              <a:t>.__index</a:t>
-            </a:r>
-            <a:r>
-              <a:rPr lang="en-US" sz="800" dirty="0">
-                <a:latin typeface="Courier New" panose="02070309020205020404" pitchFamily="49" charset="0"/>
-                <a:cs typeface="Courier New" panose="02070309020205020404" pitchFamily="49" charset="0"/>
-              </a:rPr>
-              <a:t>(</a:t>
-            </a:r>
-            <a:r>
-              <a:rPr lang="en-US" sz="800" dirty="0" err="1">
-                <a:latin typeface="Courier New" panose="02070309020205020404" pitchFamily="49" charset="0"/>
-                <a:cs typeface="Courier New" panose="02070309020205020404" pitchFamily="49" charset="0"/>
-              </a:rPr>
-              <a:t>self.author</a:t>
-            </a:r>
-            <a:r>
-              <a:rPr lang="en-US" sz="800" dirty="0">
-                <a:latin typeface="Courier New" panose="02070309020205020404" pitchFamily="49" charset="0"/>
-                <a:cs typeface="Courier New" panose="02070309020205020404" pitchFamily="49" charset="0"/>
-              </a:rPr>
-              <a:t>)</a:t>
-            </a:r>
-          </a:p>
-          <a:p>
-            <a:r>
-              <a:rPr lang="en-US" sz="800" dirty="0" smtClean="0">
-                <a:latin typeface="Courier New" panose="02070309020205020404" pitchFamily="49" charset="0"/>
-                <a:cs typeface="Courier New" panose="02070309020205020404" pitchFamily="49" charset="0"/>
-              </a:rPr>
-              <a:t>    </a:t>
-            </a:r>
-            <a:r>
-              <a:rPr lang="en-US" sz="800" dirty="0" err="1" smtClean="0">
-                <a:latin typeface="Courier New" panose="02070309020205020404" pitchFamily="49" charset="0"/>
-                <a:cs typeface="Courier New" panose="02070309020205020404" pitchFamily="49" charset="0"/>
-              </a:rPr>
-              <a:t>self</a:t>
-            </a:r>
-            <a:r>
-              <a:rPr lang="en-US" sz="800" dirty="0" err="1">
-                <a:latin typeface="Courier New" panose="02070309020205020404" pitchFamily="49" charset="0"/>
-                <a:cs typeface="Courier New" panose="02070309020205020404" pitchFamily="49" charset="0"/>
-              </a:rPr>
-              <a:t>.__index</a:t>
-            </a:r>
-            <a:r>
-              <a:rPr lang="en-US" sz="800" dirty="0">
-                <a:latin typeface="Courier New" panose="02070309020205020404" pitchFamily="49" charset="0"/>
-                <a:cs typeface="Courier New" panose="02070309020205020404" pitchFamily="49" charset="0"/>
-              </a:rPr>
-              <a:t>(</a:t>
-            </a:r>
-            <a:r>
-              <a:rPr lang="en-US" sz="800" dirty="0" err="1">
-                <a:latin typeface="Courier New" panose="02070309020205020404" pitchFamily="49" charset="0"/>
-                <a:cs typeface="Courier New" panose="02070309020205020404" pitchFamily="49" charset="0"/>
-              </a:rPr>
-              <a:t>self.biblio</a:t>
-            </a:r>
-            <a:r>
-              <a:rPr lang="en-US" sz="800" dirty="0">
-                <a:latin typeface="Courier New" panose="02070309020205020404" pitchFamily="49" charset="0"/>
-                <a:cs typeface="Courier New" panose="02070309020205020404" pitchFamily="49" charset="0"/>
-              </a:rPr>
-              <a:t>)</a:t>
-            </a:r>
-          </a:p>
-          <a:p>
-            <a:r>
-              <a:rPr lang="en-US" sz="800" dirty="0" smtClean="0">
-                <a:latin typeface="Courier New" panose="02070309020205020404" pitchFamily="49" charset="0"/>
-                <a:cs typeface="Courier New" panose="02070309020205020404" pitchFamily="49" charset="0"/>
-              </a:rPr>
-              <a:t>    </a:t>
-            </a:r>
-            <a:r>
-              <a:rPr lang="en-US" sz="800" dirty="0" err="1" smtClean="0">
-                <a:latin typeface="Courier New" panose="02070309020205020404" pitchFamily="49" charset="0"/>
-                <a:cs typeface="Courier New" panose="02070309020205020404" pitchFamily="49" charset="0"/>
-              </a:rPr>
-              <a:t>self</a:t>
-            </a:r>
-            <a:r>
-              <a:rPr lang="en-US" sz="800" dirty="0" err="1">
-                <a:latin typeface="Courier New" panose="02070309020205020404" pitchFamily="49" charset="0"/>
-                <a:cs typeface="Courier New" panose="02070309020205020404" pitchFamily="49" charset="0"/>
-              </a:rPr>
-              <a:t>.__index</a:t>
-            </a:r>
-            <a:r>
-              <a:rPr lang="en-US" sz="800" dirty="0">
-                <a:latin typeface="Courier New" panose="02070309020205020404" pitchFamily="49" charset="0"/>
-                <a:cs typeface="Courier New" panose="02070309020205020404" pitchFamily="49" charset="0"/>
-              </a:rPr>
-              <a:t>(</a:t>
-            </a:r>
-            <a:r>
-              <a:rPr lang="en-US" sz="800" dirty="0" err="1">
-                <a:latin typeface="Courier New" panose="02070309020205020404" pitchFamily="49" charset="0"/>
-                <a:cs typeface="Courier New" panose="02070309020205020404" pitchFamily="49" charset="0"/>
-              </a:rPr>
-              <a:t>self.text</a:t>
-            </a:r>
-            <a:r>
-              <a:rPr lang="en-US" sz="800" dirty="0" smtClean="0">
-                <a:latin typeface="Courier New" panose="02070309020205020404" pitchFamily="49" charset="0"/>
-                <a:cs typeface="Courier New" panose="02070309020205020404" pitchFamily="49" charset="0"/>
-              </a:rPr>
-              <a:t>)</a:t>
-            </a:r>
-            <a:r>
-              <a:rPr lang="en-US" sz="800" dirty="0">
-                <a:latin typeface="Courier New" panose="02070309020205020404" pitchFamily="49" charset="0"/>
-                <a:cs typeface="Courier New" panose="02070309020205020404" pitchFamily="49" charset="0"/>
-              </a:rPr>
-              <a:t/>
-            </a:r>
-            <a:br>
-              <a:rPr lang="en-US" sz="800" dirty="0">
-                <a:latin typeface="Courier New" panose="02070309020205020404" pitchFamily="49" charset="0"/>
-                <a:cs typeface="Courier New" panose="02070309020205020404" pitchFamily="49" charset="0"/>
-              </a:rPr>
-            </a:br>
-            <a:endParaRPr lang="en-US" sz="800" dirty="0">
-              <a:latin typeface="Courier New" panose="02070309020205020404" pitchFamily="49" charset="0"/>
-              <a:cs typeface="Courier New" panose="02070309020205020404" pitchFamily="49" charset="0"/>
-            </a:endParaRPr>
-          </a:p>
-          <a:p>
-            <a:r>
-              <a:rPr lang="en-US" sz="800" dirty="0" smtClean="0">
-                <a:latin typeface="Courier New" panose="02070309020205020404" pitchFamily="49" charset="0"/>
-                <a:cs typeface="Courier New" panose="02070309020205020404" pitchFamily="49" charset="0"/>
-              </a:rPr>
-              <a:t>  </a:t>
-            </a:r>
-            <a:r>
-              <a:rPr lang="en-US" sz="800" dirty="0" err="1" smtClean="0">
-                <a:latin typeface="Courier New" panose="02070309020205020404" pitchFamily="49" charset="0"/>
-                <a:cs typeface="Courier New" panose="02070309020205020404" pitchFamily="49" charset="0"/>
-              </a:rPr>
-              <a:t>def</a:t>
-            </a:r>
-            <a:r>
-              <a:rPr lang="en-US" sz="800" dirty="0" smtClean="0">
-                <a:latin typeface="Courier New" panose="02070309020205020404" pitchFamily="49" charset="0"/>
-                <a:cs typeface="Courier New" panose="02070309020205020404" pitchFamily="49" charset="0"/>
-              </a:rPr>
-              <a:t> </a:t>
-            </a:r>
-            <a:r>
-              <a:rPr lang="en-US" sz="800" dirty="0">
-                <a:latin typeface="Courier New" panose="02070309020205020404" pitchFamily="49" charset="0"/>
-                <a:cs typeface="Courier New" panose="02070309020205020404" pitchFamily="49" charset="0"/>
-              </a:rPr>
-              <a:t>__index(self, </a:t>
-            </a:r>
-            <a:r>
-              <a:rPr lang="en-US" sz="800" dirty="0" err="1">
-                <a:latin typeface="Courier New" panose="02070309020205020404" pitchFamily="49" charset="0"/>
-                <a:cs typeface="Courier New" panose="02070309020205020404" pitchFamily="49" charset="0"/>
-              </a:rPr>
-              <a:t>str</a:t>
-            </a:r>
-            <a:r>
-              <a:rPr lang="en-US" sz="800" dirty="0">
-                <a:latin typeface="Courier New" panose="02070309020205020404" pitchFamily="49" charset="0"/>
-                <a:cs typeface="Courier New" panose="02070309020205020404" pitchFamily="49" charset="0"/>
-              </a:rPr>
-              <a:t>):</a:t>
-            </a:r>
-          </a:p>
-          <a:p>
-            <a:r>
-              <a:rPr lang="en-US" sz="800" dirty="0" smtClean="0">
-                <a:latin typeface="Courier New" panose="02070309020205020404" pitchFamily="49" charset="0"/>
-                <a:cs typeface="Courier New" panose="02070309020205020404" pitchFamily="49" charset="0"/>
-              </a:rPr>
-              <a:t>    # </a:t>
-            </a:r>
-            <a:r>
-              <a:rPr lang="en-US" sz="800" dirty="0">
-                <a:latin typeface="Courier New" panose="02070309020205020404" pitchFamily="49" charset="0"/>
-                <a:cs typeface="Courier New" panose="02070309020205020404" pitchFamily="49" charset="0"/>
-              </a:rPr>
-              <a:t>replace punctuation delimiters with whitespace delimiters and split</a:t>
-            </a:r>
-          </a:p>
-          <a:p>
-            <a:r>
-              <a:rPr lang="en-US" sz="800" dirty="0" smtClean="0">
-                <a:latin typeface="Courier New" panose="02070309020205020404" pitchFamily="49" charset="0"/>
-                <a:cs typeface="Courier New" panose="02070309020205020404" pitchFamily="49" charset="0"/>
-              </a:rPr>
-              <a:t>    for </a:t>
-            </a:r>
-            <a:r>
-              <a:rPr lang="en-US" sz="800" dirty="0">
-                <a:latin typeface="Courier New" panose="02070309020205020404" pitchFamily="49" charset="0"/>
-                <a:cs typeface="Courier New" panose="02070309020205020404" pitchFamily="49" charset="0"/>
-              </a:rPr>
-              <a:t>word in </a:t>
-            </a:r>
-            <a:r>
-              <a:rPr lang="en-US" sz="800" dirty="0" err="1">
-                <a:latin typeface="Courier New" panose="02070309020205020404" pitchFamily="49" charset="0"/>
-                <a:cs typeface="Courier New" panose="02070309020205020404" pitchFamily="49" charset="0"/>
-              </a:rPr>
-              <a:t>re.sub</a:t>
-            </a:r>
-            <a:r>
-              <a:rPr lang="en-US" sz="800" dirty="0">
-                <a:latin typeface="Courier New" panose="02070309020205020404" pitchFamily="49" charset="0"/>
-                <a:cs typeface="Courier New" panose="02070309020205020404" pitchFamily="49" charset="0"/>
-              </a:rPr>
-              <a:t>('[^\w]+', ' ', </a:t>
-            </a:r>
-            <a:r>
-              <a:rPr lang="en-US" sz="800" dirty="0" err="1">
-                <a:latin typeface="Courier New" panose="02070309020205020404" pitchFamily="49" charset="0"/>
-                <a:cs typeface="Courier New" panose="02070309020205020404" pitchFamily="49" charset="0"/>
-              </a:rPr>
-              <a:t>str.upper</a:t>
-            </a:r>
-            <a:r>
-              <a:rPr lang="en-US" sz="800" dirty="0">
-                <a:latin typeface="Courier New" panose="02070309020205020404" pitchFamily="49" charset="0"/>
-                <a:cs typeface="Courier New" panose="02070309020205020404" pitchFamily="49" charset="0"/>
-              </a:rPr>
-              <a:t>()).split(): </a:t>
-            </a:r>
-          </a:p>
-          <a:p>
-            <a:endParaRPr lang="en-US" sz="800" dirty="0" smtClean="0">
-              <a:latin typeface="Courier New" panose="02070309020205020404" pitchFamily="49" charset="0"/>
-              <a:cs typeface="Courier New" panose="02070309020205020404" pitchFamily="49" charset="0"/>
-            </a:endParaRPr>
-          </a:p>
-          <a:p>
-            <a:r>
-              <a:rPr lang="en-US" sz="800" dirty="0" smtClean="0">
-                <a:latin typeface="Courier New" panose="02070309020205020404" pitchFamily="49" charset="0"/>
-                <a:cs typeface="Courier New" panose="02070309020205020404" pitchFamily="49" charset="0"/>
-              </a:rPr>
-              <a:t>    # </a:t>
-            </a:r>
-            <a:r>
-              <a:rPr lang="en-US" sz="800" dirty="0">
-                <a:latin typeface="Courier New" panose="02070309020205020404" pitchFamily="49" charset="0"/>
-                <a:cs typeface="Courier New" panose="02070309020205020404" pitchFamily="49" charset="0"/>
-              </a:rPr>
-              <a:t>don't index unnecessarily short words or numbers</a:t>
-            </a:r>
-          </a:p>
-          <a:p>
-            <a:r>
-              <a:rPr lang="en-US" sz="800" dirty="0" smtClean="0">
-                <a:latin typeface="Courier New" panose="02070309020205020404" pitchFamily="49" charset="0"/>
-                <a:cs typeface="Courier New" panose="02070309020205020404" pitchFamily="49" charset="0"/>
-              </a:rPr>
-              <a:t>    if </a:t>
-            </a:r>
-            <a:r>
-              <a:rPr lang="en-US" sz="800" dirty="0">
-                <a:latin typeface="Courier New" panose="02070309020205020404" pitchFamily="49" charset="0"/>
-                <a:cs typeface="Courier New" panose="02070309020205020404" pitchFamily="49" charset="0"/>
-              </a:rPr>
-              <a:t>word not in </a:t>
-            </a:r>
-            <a:r>
-              <a:rPr lang="en-US" sz="800" dirty="0" err="1">
-                <a:latin typeface="Courier New" panose="02070309020205020404" pitchFamily="49" charset="0"/>
-                <a:cs typeface="Courier New" panose="02070309020205020404" pitchFamily="49" charset="0"/>
-              </a:rPr>
-              <a:t>stopWords</a:t>
-            </a:r>
-            <a:r>
-              <a:rPr lang="en-US" sz="800" dirty="0">
-                <a:latin typeface="Courier New" panose="02070309020205020404" pitchFamily="49" charset="0"/>
-                <a:cs typeface="Courier New" panose="02070309020205020404" pitchFamily="49" charset="0"/>
-              </a:rPr>
-              <a:t> and </a:t>
-            </a:r>
-            <a:r>
-              <a:rPr lang="en-US" sz="800" dirty="0" err="1">
-                <a:latin typeface="Courier New" panose="02070309020205020404" pitchFamily="49" charset="0"/>
-                <a:cs typeface="Courier New" panose="02070309020205020404" pitchFamily="49" charset="0"/>
-              </a:rPr>
-              <a:t>re.search</a:t>
-            </a:r>
-            <a:r>
-              <a:rPr lang="en-US" sz="800" dirty="0">
-                <a:latin typeface="Courier New" panose="02070309020205020404" pitchFamily="49" charset="0"/>
-                <a:cs typeface="Courier New" panose="02070309020205020404" pitchFamily="49" charset="0"/>
-              </a:rPr>
-              <a:t>('[a-</a:t>
-            </a:r>
-            <a:r>
-              <a:rPr lang="en-US" sz="800" dirty="0" err="1">
-                <a:latin typeface="Courier New" panose="02070309020205020404" pitchFamily="49" charset="0"/>
-                <a:cs typeface="Courier New" panose="02070309020205020404" pitchFamily="49" charset="0"/>
-              </a:rPr>
-              <a:t>zA</a:t>
-            </a:r>
-            <a:r>
-              <a:rPr lang="en-US" sz="800" dirty="0">
-                <a:latin typeface="Courier New" panose="02070309020205020404" pitchFamily="49" charset="0"/>
-                <a:cs typeface="Courier New" panose="02070309020205020404" pitchFamily="49" charset="0"/>
-              </a:rPr>
-              <a:t>-Z]', word): </a:t>
-            </a:r>
-          </a:p>
-          <a:p>
-            <a:r>
-              <a:rPr lang="en-US" sz="800" dirty="0" smtClean="0">
-                <a:latin typeface="Courier New" panose="02070309020205020404" pitchFamily="49" charset="0"/>
-                <a:cs typeface="Courier New" panose="02070309020205020404" pitchFamily="49" charset="0"/>
-              </a:rPr>
-              <a:t>      if </a:t>
-            </a:r>
-            <a:r>
-              <a:rPr lang="en-US" sz="800" dirty="0">
-                <a:latin typeface="Courier New" panose="02070309020205020404" pitchFamily="49" charset="0"/>
-                <a:cs typeface="Courier New" panose="02070309020205020404" pitchFamily="49" charset="0"/>
-              </a:rPr>
-              <a:t>not word in </a:t>
-            </a:r>
-            <a:r>
-              <a:rPr lang="en-US" sz="800" dirty="0" err="1">
-                <a:latin typeface="Courier New" panose="02070309020205020404" pitchFamily="49" charset="0"/>
-                <a:cs typeface="Courier New" panose="02070309020205020404" pitchFamily="49" charset="0"/>
-              </a:rPr>
-              <a:t>DOC.docsHave</a:t>
-            </a:r>
-            <a:r>
-              <a:rPr lang="en-US" sz="800" dirty="0">
-                <a:latin typeface="Courier New" panose="02070309020205020404" pitchFamily="49" charset="0"/>
-                <a:cs typeface="Courier New" panose="02070309020205020404" pitchFamily="49" charset="0"/>
-              </a:rPr>
-              <a:t>:</a:t>
-            </a:r>
-          </a:p>
-          <a:p>
-            <a:r>
-              <a:rPr lang="en-US" sz="800" dirty="0" smtClean="0">
-                <a:latin typeface="Courier New" panose="02070309020205020404" pitchFamily="49" charset="0"/>
-                <a:cs typeface="Courier New" panose="02070309020205020404" pitchFamily="49" charset="0"/>
-              </a:rPr>
-              <a:t>        </a:t>
-            </a:r>
-            <a:r>
-              <a:rPr lang="en-US" sz="800" dirty="0" err="1" smtClean="0">
-                <a:latin typeface="Courier New" panose="02070309020205020404" pitchFamily="49" charset="0"/>
-                <a:cs typeface="Courier New" panose="02070309020205020404" pitchFamily="49" charset="0"/>
-              </a:rPr>
-              <a:t>DOC.docsHave</a:t>
-            </a:r>
-            <a:r>
-              <a:rPr lang="en-US" sz="800" dirty="0" smtClean="0">
-                <a:latin typeface="Courier New" panose="02070309020205020404" pitchFamily="49" charset="0"/>
-                <a:cs typeface="Courier New" panose="02070309020205020404" pitchFamily="49" charset="0"/>
-              </a:rPr>
-              <a:t>[word</a:t>
-            </a:r>
-            <a:r>
-              <a:rPr lang="en-US" sz="800" dirty="0">
-                <a:latin typeface="Courier New" panose="02070309020205020404" pitchFamily="49" charset="0"/>
-                <a:cs typeface="Courier New" panose="02070309020205020404" pitchFamily="49" charset="0"/>
-              </a:rPr>
-              <a:t>] = []</a:t>
-            </a:r>
-          </a:p>
-          <a:p>
-            <a:r>
-              <a:rPr lang="en-US" sz="800" dirty="0" smtClean="0">
-                <a:latin typeface="Courier New" panose="02070309020205020404" pitchFamily="49" charset="0"/>
-                <a:cs typeface="Courier New" panose="02070309020205020404" pitchFamily="49" charset="0"/>
-              </a:rPr>
-              <a:t>      if </a:t>
-            </a:r>
-            <a:r>
-              <a:rPr lang="en-US" sz="800" dirty="0">
-                <a:latin typeface="Courier New" panose="02070309020205020404" pitchFamily="49" charset="0"/>
-                <a:cs typeface="Courier New" panose="02070309020205020404" pitchFamily="49" charset="0"/>
-              </a:rPr>
-              <a:t>not word in </a:t>
-            </a:r>
-            <a:r>
-              <a:rPr lang="en-US" sz="800" dirty="0" err="1">
-                <a:latin typeface="Courier New" panose="02070309020205020404" pitchFamily="49" charset="0"/>
-                <a:cs typeface="Courier New" panose="02070309020205020404" pitchFamily="49" charset="0"/>
-              </a:rPr>
-              <a:t>self.docHas</a:t>
-            </a:r>
-            <a:r>
-              <a:rPr lang="en-US" sz="800" dirty="0">
-                <a:latin typeface="Courier New" panose="02070309020205020404" pitchFamily="49" charset="0"/>
-                <a:cs typeface="Courier New" panose="02070309020205020404" pitchFamily="49" charset="0"/>
-              </a:rPr>
-              <a:t>:</a:t>
-            </a:r>
-          </a:p>
-          <a:p>
-            <a:r>
-              <a:rPr lang="en-US" sz="800" dirty="0" smtClean="0">
-                <a:latin typeface="Courier New" panose="02070309020205020404" pitchFamily="49" charset="0"/>
-                <a:cs typeface="Courier New" panose="02070309020205020404" pitchFamily="49" charset="0"/>
-              </a:rPr>
-              <a:t>        </a:t>
-            </a:r>
-            <a:r>
-              <a:rPr lang="en-US" sz="800" dirty="0" err="1" smtClean="0">
-                <a:latin typeface="Courier New" panose="02070309020205020404" pitchFamily="49" charset="0"/>
-                <a:cs typeface="Courier New" panose="02070309020205020404" pitchFamily="49" charset="0"/>
-              </a:rPr>
-              <a:t>DOC.docsHave</a:t>
-            </a:r>
-            <a:r>
-              <a:rPr lang="en-US" sz="800" dirty="0" smtClean="0">
-                <a:latin typeface="Courier New" panose="02070309020205020404" pitchFamily="49" charset="0"/>
-                <a:cs typeface="Courier New" panose="02070309020205020404" pitchFamily="49" charset="0"/>
-              </a:rPr>
-              <a:t>[word</a:t>
-            </a:r>
-            <a:r>
-              <a:rPr lang="en-US" sz="800" dirty="0">
-                <a:latin typeface="Courier New" panose="02070309020205020404" pitchFamily="49" charset="0"/>
-                <a:cs typeface="Courier New" panose="02070309020205020404" pitchFamily="49" charset="0"/>
-              </a:rPr>
-              <a:t>].append(self)</a:t>
-            </a:r>
-          </a:p>
-          <a:p>
-            <a:r>
-              <a:rPr lang="en-US" sz="800" dirty="0" smtClean="0">
-                <a:latin typeface="Courier New" panose="02070309020205020404" pitchFamily="49" charset="0"/>
-                <a:cs typeface="Courier New" panose="02070309020205020404" pitchFamily="49" charset="0"/>
-              </a:rPr>
-              <a:t>      </a:t>
-            </a:r>
-            <a:r>
-              <a:rPr lang="en-US" sz="800" dirty="0" err="1" smtClean="0">
-                <a:latin typeface="Courier New" panose="02070309020205020404" pitchFamily="49" charset="0"/>
-                <a:cs typeface="Courier New" panose="02070309020205020404" pitchFamily="49" charset="0"/>
-              </a:rPr>
-              <a:t>self.docHas</a:t>
-            </a:r>
-            <a:r>
-              <a:rPr lang="en-US" sz="800" dirty="0" smtClean="0">
-                <a:latin typeface="Courier New" panose="02070309020205020404" pitchFamily="49" charset="0"/>
-                <a:cs typeface="Courier New" panose="02070309020205020404" pitchFamily="49" charset="0"/>
-              </a:rPr>
-              <a:t>[word</a:t>
-            </a:r>
-            <a:r>
-              <a:rPr lang="en-US" sz="800" dirty="0">
-                <a:latin typeface="Courier New" panose="02070309020205020404" pitchFamily="49" charset="0"/>
-                <a:cs typeface="Courier New" panose="02070309020205020404" pitchFamily="49" charset="0"/>
-              </a:rPr>
-              <a:t>] = 1</a:t>
-            </a:r>
-          </a:p>
-          <a:p>
-            <a:r>
-              <a:rPr lang="en-US" sz="800" dirty="0" smtClean="0">
-                <a:latin typeface="Courier New" panose="02070309020205020404" pitchFamily="49" charset="0"/>
-                <a:cs typeface="Courier New" panose="02070309020205020404" pitchFamily="49" charset="0"/>
-              </a:rPr>
-              <a:t>    else</a:t>
-            </a:r>
-            <a:r>
-              <a:rPr lang="en-US" sz="800" dirty="0">
-                <a:latin typeface="Courier New" panose="02070309020205020404" pitchFamily="49" charset="0"/>
-                <a:cs typeface="Courier New" panose="02070309020205020404" pitchFamily="49" charset="0"/>
-              </a:rPr>
-              <a:t>:</a:t>
-            </a:r>
-          </a:p>
-          <a:p>
-            <a:r>
-              <a:rPr lang="en-US" sz="800" dirty="0" smtClean="0">
-                <a:latin typeface="Courier New" panose="02070309020205020404" pitchFamily="49" charset="0"/>
-                <a:cs typeface="Courier New" panose="02070309020205020404" pitchFamily="49" charset="0"/>
-              </a:rPr>
-              <a:t>      </a:t>
-            </a:r>
-            <a:r>
-              <a:rPr lang="en-US" sz="800" dirty="0" err="1" smtClean="0">
-                <a:latin typeface="Courier New" panose="02070309020205020404" pitchFamily="49" charset="0"/>
-                <a:cs typeface="Courier New" panose="02070309020205020404" pitchFamily="49" charset="0"/>
-              </a:rPr>
-              <a:t>self.docHas</a:t>
-            </a:r>
-            <a:r>
-              <a:rPr lang="en-US" sz="800" dirty="0" smtClean="0">
-                <a:latin typeface="Courier New" panose="02070309020205020404" pitchFamily="49" charset="0"/>
-                <a:cs typeface="Courier New" panose="02070309020205020404" pitchFamily="49" charset="0"/>
-              </a:rPr>
-              <a:t>[word</a:t>
-            </a:r>
-            <a:r>
-              <a:rPr lang="en-US" sz="800" dirty="0">
-                <a:latin typeface="Courier New" panose="02070309020205020404" pitchFamily="49" charset="0"/>
-                <a:cs typeface="Courier New" panose="02070309020205020404" pitchFamily="49" charset="0"/>
-              </a:rPr>
-              <a:t>] += </a:t>
-            </a:r>
-            <a:r>
-              <a:rPr lang="en-US" sz="800" dirty="0" smtClean="0">
-                <a:latin typeface="Courier New" panose="02070309020205020404" pitchFamily="49" charset="0"/>
-                <a:cs typeface="Courier New" panose="02070309020205020404" pitchFamily="49" charset="0"/>
-              </a:rPr>
-              <a:t>1</a:t>
-            </a:r>
-            <a:endParaRPr lang="en-US" sz="800" dirty="0">
-              <a:latin typeface="Courier New" panose="02070309020205020404" pitchFamily="49" charset="0"/>
-              <a:cs typeface="Courier New" panose="02070309020205020404" pitchFamily="49" charset="0"/>
-            </a:endParaRPr>
-          </a:p>
-        </p:txBody>
-      </p:sp>
+      </p:pic>
     </p:spTree>
     <p:extLst>
       <p:ext uri="{BB962C8B-B14F-4D97-AF65-F5344CB8AC3E}">
@@ -6335,6 +5491,13 @@
   <p:clrMapOvr>
     <a:masterClrMapping/>
   </p:clrMapOvr>
+  <p:timing>
+    <p:tnLst>
+      <p:par>
+        <p:cTn id="1" dur="indefinite" restart="never" nodeType="tmRoot"/>
+      </p:par>
+    </p:tnLst>
+  </p:timing>
 </p:sld>
 </file>
 
@@ -6822,6 +5985,91 @@
   <p:clrMapOvr>
     <a:masterClrMapping/>
   </p:clrMapOvr>
+  <p:timing>
+    <p:tnLst>
+      <p:par>
+        <p:cTn id="1" dur="indefinite" restart="never" nodeType="tmRoot"/>
+      </p:par>
+    </p:tnLst>
+  </p:timing>
+</p:sld>
+</file>
+
+<file path=ppt/slides/slide5.xml><?xml version="1.0" encoding="utf-8"?>
+<p:sld xmlns:a="http://schemas.openxmlformats.org/drawingml/2006/main" xmlns:r="http://schemas.openxmlformats.org/officeDocument/2006/relationships" xmlns:p="http://schemas.openxmlformats.org/presentationml/2006/main">
+  <p:cSld>
+    <p:spTree>
+      <p:nvGrpSpPr>
+        <p:cNvPr id="1" name=""/>
+        <p:cNvGrpSpPr/>
+        <p:nvPr/>
+      </p:nvGrpSpPr>
+      <p:grpSpPr>
+        <a:xfrm>
+          <a:off x="0" y="0"/>
+          <a:ext cx="0" cy="0"/>
+          <a:chOff x="0" y="0"/>
+          <a:chExt cx="0" cy="0"/>
+        </a:xfrm>
+      </p:grpSpPr>
+      <p:pic>
+        <p:nvPicPr>
+          <p:cNvPr id="2051" name="Picture 3" descr="C:\Users\John\Desktop\Final Projects\presentation\code shots\transparent.png"/>
+          <p:cNvPicPr>
+            <a:picLocks noChangeAspect="1" noChangeArrowheads="1"/>
+          </p:cNvPicPr>
+          <p:nvPr/>
+        </p:nvPicPr>
+        <p:blipFill>
+          <a:blip r:embed="rId2" cstate="email">
+            <a:extLst>
+              <a:ext uri="{28A0092B-C50C-407E-A947-70E740481C1C}">
+                <a14:useLocalDpi xmlns:a14="http://schemas.microsoft.com/office/drawing/2010/main" val="0"/>
+              </a:ext>
+            </a:extLst>
+          </a:blip>
+          <a:srcRect/>
+          <a:stretch>
+            <a:fillRect/>
+          </a:stretch>
+        </p:blipFill>
+        <p:spPr bwMode="auto">
+          <a:xfrm>
+            <a:off x="1069975" y="8935"/>
+            <a:ext cx="7004050" cy="5029200"/>
+          </a:xfrm>
+          <a:prstGeom prst="rect">
+            <a:avLst/>
+          </a:prstGeom>
+          <a:noFill/>
+          <a:extLst>
+            <a:ext uri="{909E8E84-426E-40DD-AFC4-6F175D3DCCD1}">
+              <a14:hiddenFill xmlns:a14="http://schemas.microsoft.com/office/drawing/2010/main">
+                <a:solidFill>
+                  <a:srgbClr val="FFFFFF"/>
+                </a:solidFill>
+              </a14:hiddenFill>
+            </a:ext>
+          </a:extLst>
+        </p:spPr>
+      </p:pic>
+    </p:spTree>
+    <p:extLst>
+      <p:ext uri="{BB962C8B-B14F-4D97-AF65-F5344CB8AC3E}">
+        <p14:creationId xmlns:p14="http://schemas.microsoft.com/office/powerpoint/2010/main" val="2475928199"/>
+      </p:ext>
+    </p:extLst>
+  </p:cSld>
+  <p:clrMapOvr>
+    <a:masterClrMapping/>
+  </p:clrMapOvr>
+  <p:timing>
+    <p:tnLst>
+      <p:par>
+        <p:cTn id="1" dur="indefinite" restart="never" nodeType="tmRoot"/>
+      </p:par>
+    </p:tnLst>
+  </p:timing>
 </p:sld>
 </file>
 

</xml_diff>